<commit_message>
Added results of naive bayes
</commit_message>
<xml_diff>
--- a/Yelp Reviews – A Study.pptx
+++ b/Yelp Reviews – A Study.pptx
@@ -5,7 +5,7 @@
     <p:sldMasterId id="2147483852" r:id="rId1"/>
   </p:sldMasterIdLst>
   <p:notesMasterIdLst>
-    <p:notesMasterId r:id="rId20"/>
+    <p:notesMasterId r:id="rId21"/>
   </p:notesMasterIdLst>
   <p:sldIdLst>
     <p:sldId id="256" r:id="rId2"/>
@@ -21,11 +21,12 @@
     <p:sldId id="268" r:id="rId12"/>
     <p:sldId id="272" r:id="rId13"/>
     <p:sldId id="261" r:id="rId14"/>
-    <p:sldId id="269" r:id="rId15"/>
-    <p:sldId id="270" r:id="rId16"/>
-    <p:sldId id="271" r:id="rId17"/>
-    <p:sldId id="262" r:id="rId18"/>
-    <p:sldId id="265" r:id="rId19"/>
+    <p:sldId id="276" r:id="rId15"/>
+    <p:sldId id="269" r:id="rId16"/>
+    <p:sldId id="270" r:id="rId17"/>
+    <p:sldId id="271" r:id="rId18"/>
+    <p:sldId id="262" r:id="rId19"/>
+    <p:sldId id="265" r:id="rId20"/>
   </p:sldIdLst>
   <p:sldSz cx="12192000" cy="6858000"/>
   <p:notesSz cx="6858000" cy="9144000"/>
@@ -126,7 +127,7 @@
   </p:defaultTextStyle>
   <p:extLst>
     <p:ext uri="{EFAFB233-063F-42B5-8137-9DF3F51BA10A}">
-      <p15:sldGuideLst xmlns:p15="http://schemas.microsoft.com/office/powerpoint/2012/main"/>
+      <p15:sldGuideLst xmlns:p15="http://schemas.microsoft.com/office/powerpoint/2012/main" xmlns=""/>
     </p:ext>
   </p:extLst>
 </p:presentation>
@@ -1731,15 +1732,7 @@
           </a:r>
           <a:r>
             <a:rPr lang="en-US" dirty="0" smtClean="0"/>
-            <a:t> using the </a:t>
-          </a:r>
-          <a:r>
-            <a:rPr lang="en-US" dirty="0" smtClean="0"/>
-            <a:t>NLTK package </a:t>
-          </a:r>
-          <a:r>
-            <a:rPr lang="en-US" dirty="0" smtClean="0"/>
-            <a:t>from the user reviews.</a:t>
+            <a:t> using the NLTK package from the user reviews.</a:t>
           </a:r>
           <a:endParaRPr lang="en-US" dirty="0"/>
         </a:p>
@@ -1776,35 +1769,7 @@
         <a:p>
           <a:r>
             <a:rPr lang="en-US" dirty="0" smtClean="0"/>
-            <a:t>Applied Naïve Bayes </a:t>
-          </a:r>
-          <a:r>
-            <a:rPr lang="en-US" dirty="0" smtClean="0"/>
-            <a:t>using NLTK , </a:t>
-          </a:r>
-          <a:r>
-            <a:rPr lang="en-US" dirty="0" smtClean="0"/>
-            <a:t>dividing the </a:t>
-          </a:r>
-          <a:r>
-            <a:rPr lang="en-US" dirty="0" smtClean="0"/>
-            <a:t>text into </a:t>
-          </a:r>
-          <a:r>
-            <a:rPr lang="en-US" dirty="0" smtClean="0"/>
-            <a:t>positive and negative reviews </a:t>
-          </a:r>
-          <a:r>
-            <a:rPr lang="en-US" dirty="0" smtClean="0"/>
-            <a:t>based </a:t>
-          </a:r>
-          <a:r>
-            <a:rPr lang="en-US" dirty="0" smtClean="0"/>
-            <a:t>on “stars</a:t>
-          </a:r>
-          <a:r>
-            <a:rPr lang="en-US" dirty="0" smtClean="0"/>
-            <a:t>” ratings.</a:t>
+            <a:t>Applied Naïve Bayes using NLTK , dividing the text into positive and negative reviews based on “stars” ratings.</a:t>
           </a:r>
           <a:endParaRPr lang="en-US" dirty="0"/>
         </a:p>
@@ -1878,11 +1843,7 @@
         <a:p>
           <a:r>
             <a:rPr lang="en-US" dirty="0" smtClean="0"/>
-            <a:t>Compare </a:t>
-          </a:r>
-          <a:r>
-            <a:rPr lang="en-US" dirty="0" smtClean="0"/>
-            <a:t>the results derived from the approached mentioned above. </a:t>
+            <a:t>Compare the results derived from the approached mentioned above. </a:t>
           </a:r>
           <a:endParaRPr lang="en-US" dirty="0"/>
         </a:p>
@@ -1919,15 +1880,7 @@
         <a:p>
           <a:r>
             <a:rPr lang="en-US" dirty="0" smtClean="0"/>
-            <a:t>Extracted the user reviews (“text”) and </a:t>
-          </a:r>
-          <a:r>
-            <a:rPr lang="en-US" dirty="0" smtClean="0"/>
-            <a:t>ratings (“stars”) </a:t>
-          </a:r>
-          <a:r>
-            <a:rPr lang="en-US" dirty="0" smtClean="0"/>
-            <a:t>from </a:t>
+            <a:t>Extracted the user reviews (“text”) and ratings (“stars”) from </a:t>
           </a:r>
           <a:r>
             <a:rPr lang="en-US" dirty="0" err="1" smtClean="0"/>
@@ -1935,11 +1888,7 @@
           </a:r>
           <a:r>
             <a:rPr lang="en-US" dirty="0" smtClean="0"/>
-            <a:t> using </a:t>
-          </a:r>
-          <a:r>
-            <a:rPr lang="en-US" dirty="0" smtClean="0"/>
-            <a:t>the </a:t>
+            <a:t> using the </a:t>
           </a:r>
           <a:r>
             <a:rPr lang="en-US" dirty="0" err="1" smtClean="0"/>
@@ -1947,11 +1896,7 @@
           </a:r>
           <a:r>
             <a:rPr lang="en-US" dirty="0" smtClean="0"/>
-            <a:t> </a:t>
-          </a:r>
-          <a:r>
-            <a:rPr lang="en-US" dirty="0" smtClean="0"/>
-            <a:t>extracted.</a:t>
+            <a:t> extracted.</a:t>
           </a:r>
           <a:endParaRPr lang="en-US" dirty="0"/>
         </a:p>
@@ -2345,33 +2290,33 @@
     </dgm:pt>
   </dgm:ptLst>
   <dgm:cxnLst>
-    <dgm:cxn modelId="{C1737068-9549-4619-B0B1-0B2CBAD42C1F}" srcId="{440B7219-26B9-4F58-BA23-F5CEC713F213}" destId="{23A168AE-CB6D-4BA2-A089-D7BA0B4AC5EB}" srcOrd="2" destOrd="0" parTransId="{7F4D2B96-FEA4-45B1-8A97-79FDCCA57637}" sibTransId="{B41296E8-C6C2-4A46-91A1-1D2137D59234}"/>
-    <dgm:cxn modelId="{5DFC79F7-FD9B-425B-A697-22AB557AB0EF}" srcId="{66BBF49E-927C-4E2F-B006-D420C13E5E07}" destId="{3B965A0D-B34D-469C-8C27-047CACBA8882}" srcOrd="1" destOrd="0" parTransId="{CE897EA2-2DBE-497C-9685-22C658CC4392}" sibTransId="{A10DC2C7-5D95-4F28-8D4C-054F91AABF23}"/>
+    <dgm:cxn modelId="{C2DAE147-F2FF-45A8-A087-12F987A25418}" type="presOf" srcId="{23A168AE-CB6D-4BA2-A089-D7BA0B4AC5EB}" destId="{310B62E1-A6E3-4BA5-A387-A18CEE005F73}" srcOrd="0" destOrd="2" presId="urn:microsoft.com/office/officeart/2005/8/layout/vList5"/>
     <dgm:cxn modelId="{83886DBF-FC09-46B8-B8FF-EF1B525C93ED}" srcId="{B02FAD5E-7DCF-4382-B82D-EA1202CA4008}" destId="{66BBF49E-927C-4E2F-B006-D420C13E5E07}" srcOrd="1" destOrd="0" parTransId="{66A479B0-6EEB-4955-A0E4-A87E932C9592}" sibTransId="{E7E34E2C-1D84-4FA9-BFB8-899D69861A96}"/>
     <dgm:cxn modelId="{9CC48428-FA28-4010-910D-8ACC92FB24E7}" srcId="{66BBF49E-927C-4E2F-B006-D420C13E5E07}" destId="{BFDA33EE-4EA6-4697-BD8A-8763E67F626B}" srcOrd="2" destOrd="0" parTransId="{E14E2AA3-3A9E-41C9-B54E-7610B5874DE9}" sibTransId="{FE12E5AA-201F-4040-B950-2EFEB38BC1D7}"/>
+    <dgm:cxn modelId="{3BC05AA0-9AC4-4079-81B8-52E18E0DCD3C}" srcId="{F8EB602D-32DD-401F-87F6-30A724891281}" destId="{7125C8DE-A65C-44C5-9094-3C66A3448E0A}" srcOrd="0" destOrd="0" parTransId="{44C9816D-1A2B-4560-B56F-8D7CC0D82897}" sibTransId="{F5D34CDF-D64F-4A8B-B678-897A65BAC5F2}"/>
+    <dgm:cxn modelId="{1D4ACDDD-DCE7-4DA6-B5B3-72969CF9107C}" srcId="{440B7219-26B9-4F58-BA23-F5CEC713F213}" destId="{04910821-469B-4C2A-8A99-2CB188B2AFEA}" srcOrd="0" destOrd="0" parTransId="{1F214A71-9D37-4538-87BD-C67AFBD86213}" sibTransId="{62F1D2D8-5361-40B6-AD07-52CE57AAD498}"/>
+    <dgm:cxn modelId="{121733BF-378A-4AFA-8553-2FED7292A7D6}" type="presOf" srcId="{F8EB602D-32DD-401F-87F6-30A724891281}" destId="{6552CB70-428D-477D-9F79-F53F633EE051}" srcOrd="0" destOrd="0" presId="urn:microsoft.com/office/officeart/2005/8/layout/vList5"/>
+    <dgm:cxn modelId="{205C5758-F4AD-4D17-AE52-79FDE0555EAD}" type="presOf" srcId="{B02FAD5E-7DCF-4382-B82D-EA1202CA4008}" destId="{B0C93FC2-E9BC-4DCA-9E0E-F6EC7D4E188D}" srcOrd="0" destOrd="0" presId="urn:microsoft.com/office/officeart/2005/8/layout/vList5"/>
+    <dgm:cxn modelId="{8D3DFFDA-EC23-4B0F-9B6F-32D52930F570}" type="presOf" srcId="{440B7219-26B9-4F58-BA23-F5CEC713F213}" destId="{CF0ED83B-A46B-4B44-9C69-22DECEFDEE5C}" srcOrd="0" destOrd="0" presId="urn:microsoft.com/office/officeart/2005/8/layout/vList5"/>
+    <dgm:cxn modelId="{2B152090-28D6-402D-9F79-C38AA6958281}" type="presOf" srcId="{A34A8185-509B-40CF-A802-8834F7A8F655}" destId="{F1F6B744-2AC4-4ECE-8B41-3E8EC7938F27}" srcOrd="0" destOrd="0" presId="urn:microsoft.com/office/officeart/2005/8/layout/vList5"/>
+    <dgm:cxn modelId="{569041C3-EDEA-47AB-90A5-E8336EA2FFB9}" type="presOf" srcId="{66BBF49E-927C-4E2F-B006-D420C13E5E07}" destId="{6359AC6B-F447-453F-BA77-6A72A16943CD}" srcOrd="0" destOrd="0" presId="urn:microsoft.com/office/officeart/2005/8/layout/vList5"/>
+    <dgm:cxn modelId="{0F003E3C-3F21-4DC8-B1B0-3B6F683C4271}" type="presOf" srcId="{BFDA33EE-4EA6-4697-BD8A-8763E67F626B}" destId="{F1F6B744-2AC4-4ECE-8B41-3E8EC7938F27}" srcOrd="0" destOrd="2" presId="urn:microsoft.com/office/officeart/2005/8/layout/vList5"/>
+    <dgm:cxn modelId="{FFE6B053-E59C-45D7-9912-91DE69639793}" type="presOf" srcId="{A442E141-DED3-4F81-8BFB-BE6C1C101C96}" destId="{310B62E1-A6E3-4BA5-A387-A18CEE005F73}" srcOrd="0" destOrd="1" presId="urn:microsoft.com/office/officeart/2005/8/layout/vList5"/>
+    <dgm:cxn modelId="{5DFC79F7-FD9B-425B-A697-22AB557AB0EF}" srcId="{66BBF49E-927C-4E2F-B006-D420C13E5E07}" destId="{3B965A0D-B34D-469C-8C27-047CACBA8882}" srcOrd="1" destOrd="0" parTransId="{CE897EA2-2DBE-497C-9685-22C658CC4392}" sibTransId="{A10DC2C7-5D95-4F28-8D4C-054F91AABF23}"/>
+    <dgm:cxn modelId="{B40ABC29-3475-4340-8608-6E1C1A5B0936}" type="presOf" srcId="{3870AA8C-1B54-4CFB-8DBD-A28D301FFC71}" destId="{6B66F3B8-3F50-449F-A9ED-0A4528538A29}" srcOrd="0" destOrd="1" presId="urn:microsoft.com/office/officeart/2005/8/layout/vList5"/>
+    <dgm:cxn modelId="{3E4ED224-BD7F-44E7-94BC-CC19A4AF6182}" srcId="{66BBF49E-927C-4E2F-B006-D420C13E5E07}" destId="{A34A8185-509B-40CF-A802-8834F7A8F655}" srcOrd="0" destOrd="0" parTransId="{F254DC2D-2050-4060-8AF9-F4A70ED3633D}" sibTransId="{76454D84-600D-4426-8D14-C60ADCB380AE}"/>
+    <dgm:cxn modelId="{12F60A06-D32D-422A-A321-BC77C09BE7EF}" type="presOf" srcId="{3B965A0D-B34D-469C-8C27-047CACBA8882}" destId="{F1F6B744-2AC4-4ECE-8B41-3E8EC7938F27}" srcOrd="0" destOrd="1" presId="urn:microsoft.com/office/officeart/2005/8/layout/vList5"/>
+    <dgm:cxn modelId="{C1737068-9549-4619-B0B1-0B2CBAD42C1F}" srcId="{440B7219-26B9-4F58-BA23-F5CEC713F213}" destId="{23A168AE-CB6D-4BA2-A089-D7BA0B4AC5EB}" srcOrd="2" destOrd="0" parTransId="{7F4D2B96-FEA4-45B1-8A97-79FDCCA57637}" sibTransId="{B41296E8-C6C2-4A46-91A1-1D2137D59234}"/>
     <dgm:cxn modelId="{FCEC3736-6660-4266-9CDC-465CC2257201}" srcId="{440B7219-26B9-4F58-BA23-F5CEC713F213}" destId="{A442E141-DED3-4F81-8BFB-BE6C1C101C96}" srcOrd="1" destOrd="0" parTransId="{AB2738DA-B301-4D18-8F84-876CED973EE3}" sibTransId="{9DDB2B06-E114-46AB-9590-BA14826FBE34}"/>
+    <dgm:cxn modelId="{0EC2C390-F110-464C-8A64-C13982CBA540}" type="presOf" srcId="{0606A311-43A7-4DFA-9C0A-BAC66199669C}" destId="{6B66F3B8-3F50-449F-A9ED-0A4528538A29}" srcOrd="0" destOrd="2" presId="urn:microsoft.com/office/officeart/2005/8/layout/vList5"/>
+    <dgm:cxn modelId="{B714B41A-292B-46FF-96DD-56422B8C7317}" type="presOf" srcId="{2A5634E2-9635-4251-A518-5907D9AF1F39}" destId="{310B62E1-A6E3-4BA5-A387-A18CEE005F73}" srcOrd="0" destOrd="3" presId="urn:microsoft.com/office/officeart/2005/8/layout/vList5"/>
     <dgm:cxn modelId="{14DC4D40-77A4-464F-B107-8E887B2DA211}" srcId="{F8EB602D-32DD-401F-87F6-30A724891281}" destId="{3870AA8C-1B54-4CFB-8DBD-A28D301FFC71}" srcOrd="1" destOrd="0" parTransId="{314F7E9F-01FC-414A-91A3-2A6A7EF2EF15}" sibTransId="{E53EB828-A3A6-418A-97E1-FC6B006C2386}"/>
-    <dgm:cxn modelId="{B40ABC29-3475-4340-8608-6E1C1A5B0936}" type="presOf" srcId="{3870AA8C-1B54-4CFB-8DBD-A28D301FFC71}" destId="{6B66F3B8-3F50-449F-A9ED-0A4528538A29}" srcOrd="0" destOrd="1" presId="urn:microsoft.com/office/officeart/2005/8/layout/vList5"/>
-    <dgm:cxn modelId="{0F003E3C-3F21-4DC8-B1B0-3B6F683C4271}" type="presOf" srcId="{BFDA33EE-4EA6-4697-BD8A-8763E67F626B}" destId="{F1F6B744-2AC4-4ECE-8B41-3E8EC7938F27}" srcOrd="0" destOrd="2" presId="urn:microsoft.com/office/officeart/2005/8/layout/vList5"/>
-    <dgm:cxn modelId="{205C5758-F4AD-4D17-AE52-79FDE0555EAD}" type="presOf" srcId="{B02FAD5E-7DCF-4382-B82D-EA1202CA4008}" destId="{B0C93FC2-E9BC-4DCA-9E0E-F6EC7D4E188D}" srcOrd="0" destOrd="0" presId="urn:microsoft.com/office/officeart/2005/8/layout/vList5"/>
-    <dgm:cxn modelId="{B714B41A-292B-46FF-96DD-56422B8C7317}" type="presOf" srcId="{2A5634E2-9635-4251-A518-5907D9AF1F39}" destId="{310B62E1-A6E3-4BA5-A387-A18CEE005F73}" srcOrd="0" destOrd="3" presId="urn:microsoft.com/office/officeart/2005/8/layout/vList5"/>
-    <dgm:cxn modelId="{3E4ED224-BD7F-44E7-94BC-CC19A4AF6182}" srcId="{66BBF49E-927C-4E2F-B006-D420C13E5E07}" destId="{A34A8185-509B-40CF-A802-8834F7A8F655}" srcOrd="0" destOrd="0" parTransId="{F254DC2D-2050-4060-8AF9-F4A70ED3633D}" sibTransId="{76454D84-600D-4426-8D14-C60ADCB380AE}"/>
-    <dgm:cxn modelId="{121733BF-378A-4AFA-8553-2FED7292A7D6}" type="presOf" srcId="{F8EB602D-32DD-401F-87F6-30A724891281}" destId="{6552CB70-428D-477D-9F79-F53F633EE051}" srcOrd="0" destOrd="0" presId="urn:microsoft.com/office/officeart/2005/8/layout/vList5"/>
-    <dgm:cxn modelId="{0EC2C390-F110-464C-8A64-C13982CBA540}" type="presOf" srcId="{0606A311-43A7-4DFA-9C0A-BAC66199669C}" destId="{6B66F3B8-3F50-449F-A9ED-0A4528538A29}" srcOrd="0" destOrd="2" presId="urn:microsoft.com/office/officeart/2005/8/layout/vList5"/>
-    <dgm:cxn modelId="{1D4ACDDD-DCE7-4DA6-B5B3-72969CF9107C}" srcId="{440B7219-26B9-4F58-BA23-F5CEC713F213}" destId="{04910821-469B-4C2A-8A99-2CB188B2AFEA}" srcOrd="0" destOrd="0" parTransId="{1F214A71-9D37-4538-87BD-C67AFBD86213}" sibTransId="{62F1D2D8-5361-40B6-AD07-52CE57AAD498}"/>
-    <dgm:cxn modelId="{8D3DFFDA-EC23-4B0F-9B6F-32D52930F570}" type="presOf" srcId="{440B7219-26B9-4F58-BA23-F5CEC713F213}" destId="{CF0ED83B-A46B-4B44-9C69-22DECEFDEE5C}" srcOrd="0" destOrd="0" presId="urn:microsoft.com/office/officeart/2005/8/layout/vList5"/>
-    <dgm:cxn modelId="{3BC05AA0-9AC4-4079-81B8-52E18E0DCD3C}" srcId="{F8EB602D-32DD-401F-87F6-30A724891281}" destId="{7125C8DE-A65C-44C5-9094-3C66A3448E0A}" srcOrd="0" destOrd="0" parTransId="{44C9816D-1A2B-4560-B56F-8D7CC0D82897}" sibTransId="{F5D34CDF-D64F-4A8B-B678-897A65BAC5F2}"/>
     <dgm:cxn modelId="{FC65BDF5-58B7-428C-BA4B-9705775D7560}" type="presOf" srcId="{7125C8DE-A65C-44C5-9094-3C66A3448E0A}" destId="{6B66F3B8-3F50-449F-A9ED-0A4528538A29}" srcOrd="0" destOrd="0" presId="urn:microsoft.com/office/officeart/2005/8/layout/vList5"/>
     <dgm:cxn modelId="{C2AA35E4-6735-40B1-980E-AD19357EDA63}" srcId="{F8EB602D-32DD-401F-87F6-30A724891281}" destId="{0606A311-43A7-4DFA-9C0A-BAC66199669C}" srcOrd="2" destOrd="0" parTransId="{2D4D7928-40C9-42DC-9428-E7BD91692EF0}" sibTransId="{F09670BB-0EA0-40D4-8166-1A1A7FED8ACF}"/>
-    <dgm:cxn modelId="{FFE6B053-E59C-45D7-9912-91DE69639793}" type="presOf" srcId="{A442E141-DED3-4F81-8BFB-BE6C1C101C96}" destId="{310B62E1-A6E3-4BA5-A387-A18CEE005F73}" srcOrd="0" destOrd="1" presId="urn:microsoft.com/office/officeart/2005/8/layout/vList5"/>
     <dgm:cxn modelId="{0A2D8F61-C3B5-40C1-8A62-DE859CD1E5E6}" srcId="{440B7219-26B9-4F58-BA23-F5CEC713F213}" destId="{2A5634E2-9635-4251-A518-5907D9AF1F39}" srcOrd="3" destOrd="0" parTransId="{CA4E84B3-5D75-4EFE-B282-7DC2D8470B21}" sibTransId="{A5A45FA9-9B2C-4631-9952-24374E6027FC}"/>
-    <dgm:cxn modelId="{12F60A06-D32D-422A-A321-BC77C09BE7EF}" type="presOf" srcId="{3B965A0D-B34D-469C-8C27-047CACBA8882}" destId="{F1F6B744-2AC4-4ECE-8B41-3E8EC7938F27}" srcOrd="0" destOrd="1" presId="urn:microsoft.com/office/officeart/2005/8/layout/vList5"/>
-    <dgm:cxn modelId="{569041C3-EDEA-47AB-90A5-E8336EA2FFB9}" type="presOf" srcId="{66BBF49E-927C-4E2F-B006-D420C13E5E07}" destId="{6359AC6B-F447-453F-BA77-6A72A16943CD}" srcOrd="0" destOrd="0" presId="urn:microsoft.com/office/officeart/2005/8/layout/vList5"/>
+    <dgm:cxn modelId="{FD4C7090-E939-4514-85AE-3A1160522F5E}" srcId="{B02FAD5E-7DCF-4382-B82D-EA1202CA4008}" destId="{F8EB602D-32DD-401F-87F6-30A724891281}" srcOrd="0" destOrd="0" parTransId="{251AD511-40C9-4FD1-A6BC-7A672701D88E}" sibTransId="{4597E3EC-C439-4736-A564-5EE12350AC6B}"/>
     <dgm:cxn modelId="{26D6AA46-4658-42F5-9272-9474428996E7}" type="presOf" srcId="{04910821-469B-4C2A-8A99-2CB188B2AFEA}" destId="{310B62E1-A6E3-4BA5-A387-A18CEE005F73}" srcOrd="0" destOrd="0" presId="urn:microsoft.com/office/officeart/2005/8/layout/vList5"/>
     <dgm:cxn modelId="{EDA9BE27-2ED6-4189-AF95-F7218E180684}" srcId="{B02FAD5E-7DCF-4382-B82D-EA1202CA4008}" destId="{440B7219-26B9-4F58-BA23-F5CEC713F213}" srcOrd="2" destOrd="0" parTransId="{5469D6DB-87D4-4A31-A784-572A3B3BC2FB}" sibTransId="{D43E3D86-2647-4289-BA37-8BEB14CB4F06}"/>
-    <dgm:cxn modelId="{C2DAE147-F2FF-45A8-A087-12F987A25418}" type="presOf" srcId="{23A168AE-CB6D-4BA2-A089-D7BA0B4AC5EB}" destId="{310B62E1-A6E3-4BA5-A387-A18CEE005F73}" srcOrd="0" destOrd="2" presId="urn:microsoft.com/office/officeart/2005/8/layout/vList5"/>
-    <dgm:cxn modelId="{FD4C7090-E939-4514-85AE-3A1160522F5E}" srcId="{B02FAD5E-7DCF-4382-B82D-EA1202CA4008}" destId="{F8EB602D-32DD-401F-87F6-30A724891281}" srcOrd="0" destOrd="0" parTransId="{251AD511-40C9-4FD1-A6BC-7A672701D88E}" sibTransId="{4597E3EC-C439-4736-A564-5EE12350AC6B}"/>
-    <dgm:cxn modelId="{2B152090-28D6-402D-9F79-C38AA6958281}" type="presOf" srcId="{A34A8185-509B-40CF-A802-8834F7A8F655}" destId="{F1F6B744-2AC4-4ECE-8B41-3E8EC7938F27}" srcOrd="0" destOrd="0" presId="urn:microsoft.com/office/officeart/2005/8/layout/vList5"/>
     <dgm:cxn modelId="{7411E9B9-A7B7-44E4-9CB7-5B28DB2AD12E}" type="presParOf" srcId="{B0C93FC2-E9BC-4DCA-9E0E-F6EC7D4E188D}" destId="{5439EA84-F1A8-4E15-B056-36FB953C1ED1}" srcOrd="0" destOrd="0" presId="urn:microsoft.com/office/officeart/2005/8/layout/vList5"/>
     <dgm:cxn modelId="{A75F3DF5-F691-4FA1-9B1D-B1F135CFC061}" type="presParOf" srcId="{5439EA84-F1A8-4E15-B056-36FB953C1ED1}" destId="{6552CB70-428D-477D-9F79-F53F633EE051}" srcOrd="0" destOrd="0" presId="urn:microsoft.com/office/officeart/2005/8/layout/vList5"/>
     <dgm:cxn modelId="{EE339C24-F21D-442B-A3B4-96898E326E1E}" type="presParOf" srcId="{5439EA84-F1A8-4E15-B056-36FB953C1ED1}" destId="{6B66F3B8-3F50-449F-A9ED-0A4528538A29}" srcOrd="1" destOrd="0" presId="urn:microsoft.com/office/officeart/2005/8/layout/vList5"/>
@@ -2388,7 +2333,7 @@
   <dgm:whole/>
   <dgm:extLst>
     <a:ext uri="http://schemas.microsoft.com/office/drawing/2008/diagram">
-      <dsp:dataModelExt xmlns:dsp="http://schemas.microsoft.com/office/drawing/2008/diagram" relId="rId6" minVer="http://schemas.openxmlformats.org/drawingml/2006/diagram"/>
+      <dsp:dataModelExt xmlns:dsp="http://schemas.microsoft.com/office/drawing/2008/diagram" xmlns="" relId="rId6" minVer="http://schemas.openxmlformats.org/drawingml/2006/diagram"/>
     </a:ext>
   </dgm:extLst>
 </dgm:dataModel>
@@ -2507,9 +2452,9 @@
     </dgm:pt>
   </dgm:ptLst>
   <dgm:cxnLst>
+    <dgm:cxn modelId="{4C436720-750E-467B-9C61-813E34949D51}" type="presOf" srcId="{875CA086-A607-4AD0-AA11-F0F85C6663EA}" destId="{BFA80150-1797-4D03-A50E-4C44E733B5BD}" srcOrd="0" destOrd="0" presId="urn:microsoft.com/office/officeart/2005/8/layout/hProcess3"/>
     <dgm:cxn modelId="{FDB48FD8-121E-43A0-B381-1CF2E2E0A3E7}" srcId="{875CA086-A607-4AD0-AA11-F0F85C6663EA}" destId="{55C4517F-3B9A-421F-A61D-0A865021721C}" srcOrd="0" destOrd="0" parTransId="{0B32B723-DEC5-4C93-BB7B-64C29BB40AF1}" sibTransId="{9DB68E88-29A5-4817-89B3-DF41236B138C}"/>
     <dgm:cxn modelId="{952BCAF6-019F-4577-BCD7-642F55F47C40}" type="presOf" srcId="{55C4517F-3B9A-421F-A61D-0A865021721C}" destId="{37F18A34-0174-4FEF-AFBA-9429550C7FE0}" srcOrd="0" destOrd="0" presId="urn:microsoft.com/office/officeart/2005/8/layout/hProcess3"/>
-    <dgm:cxn modelId="{4C436720-750E-467B-9C61-813E34949D51}" type="presOf" srcId="{875CA086-A607-4AD0-AA11-F0F85C6663EA}" destId="{BFA80150-1797-4D03-A50E-4C44E733B5BD}" srcOrd="0" destOrd="0" presId="urn:microsoft.com/office/officeart/2005/8/layout/hProcess3"/>
     <dgm:cxn modelId="{659A801D-572B-430B-B0AF-11BD4FA9DAED}" type="presParOf" srcId="{BFA80150-1797-4D03-A50E-4C44E733B5BD}" destId="{E01D59AF-AE43-4079-B0BB-57FBD5FB7327}" srcOrd="0" destOrd="0" presId="urn:microsoft.com/office/officeart/2005/8/layout/hProcess3"/>
     <dgm:cxn modelId="{8187A365-F0CB-4D8A-B122-2B5690D7A3A7}" type="presParOf" srcId="{BFA80150-1797-4D03-A50E-4C44E733B5BD}" destId="{BAD99425-29E8-4490-8353-8AD706762648}" srcOrd="1" destOrd="0" presId="urn:microsoft.com/office/officeart/2005/8/layout/hProcess3"/>
     <dgm:cxn modelId="{174DF6B4-1B08-4105-8043-6CB1B06E256B}" type="presParOf" srcId="{BAD99425-29E8-4490-8353-8AD706762648}" destId="{A676C3E5-09E6-4584-B455-379A3D28BEA6}" srcOrd="0" destOrd="0" presId="urn:microsoft.com/office/officeart/2005/8/layout/hProcess3"/>
@@ -2526,14 +2471,14 @@
   <dgm:whole/>
   <dgm:extLst>
     <a:ext uri="http://schemas.microsoft.com/office/drawing/2008/diagram">
-      <dsp:dataModelExt xmlns:dsp="http://schemas.microsoft.com/office/drawing/2008/diagram" relId="rId8" minVer="http://schemas.openxmlformats.org/drawingml/2006/diagram"/>
+      <dsp:dataModelExt xmlns:dsp="http://schemas.microsoft.com/office/drawing/2008/diagram" xmlns="" relId="rId8" minVer="http://schemas.openxmlformats.org/drawingml/2006/diagram"/>
     </a:ext>
   </dgm:extLst>
 </dgm:dataModel>
 </file>
 
 <file path=ppt/diagrams/drawing1.xml><?xml version="1.0" encoding="utf-8"?>
-<dsp:drawing xmlns:dgm="http://schemas.openxmlformats.org/drawingml/2006/diagram" xmlns:dsp="http://schemas.microsoft.com/office/drawing/2008/diagram" xmlns:a="http://schemas.openxmlformats.org/drawingml/2006/main">
+<dsp:drawing xmlns:dgm="http://schemas.openxmlformats.org/drawingml/2006/diagram" xmlns:a="http://schemas.openxmlformats.org/drawingml/2006/main" xmlns:dsp="http://schemas.microsoft.com/office/drawing/2008/diagram">
   <dsp:spTree>
     <dsp:nvGrpSpPr>
       <dsp:cNvPr id="0" name=""/>
@@ -2637,15 +2582,7 @@
           </a:pPr>
           <a:r>
             <a:rPr lang="en-US" sz="1200" kern="1200" dirty="0" smtClean="0"/>
-            <a:t>Extracted the user reviews (“text”) and </a:t>
-          </a:r>
-          <a:r>
-            <a:rPr lang="en-US" sz="1200" kern="1200" dirty="0" smtClean="0"/>
-            <a:t>ratings (“stars”) </a:t>
-          </a:r>
-          <a:r>
-            <a:rPr lang="en-US" sz="1200" kern="1200" dirty="0" smtClean="0"/>
-            <a:t>from </a:t>
+            <a:t>Extracted the user reviews (“text”) and ratings (“stars”) from </a:t>
           </a:r>
           <a:r>
             <a:rPr lang="en-US" sz="1200" kern="1200" dirty="0" err="1" smtClean="0"/>
@@ -2653,11 +2590,7 @@
           </a:r>
           <a:r>
             <a:rPr lang="en-US" sz="1200" kern="1200" dirty="0" smtClean="0"/>
-            <a:t> using </a:t>
-          </a:r>
-          <a:r>
-            <a:rPr lang="en-US" sz="1200" kern="1200" dirty="0" smtClean="0"/>
-            <a:t>the </a:t>
+            <a:t> using the </a:t>
           </a:r>
           <a:r>
             <a:rPr lang="en-US" sz="1200" kern="1200" dirty="0" err="1" smtClean="0"/>
@@ -2665,11 +2598,7 @@
           </a:r>
           <a:r>
             <a:rPr lang="en-US" sz="1200" kern="1200" dirty="0" smtClean="0"/>
-            <a:t> </a:t>
-          </a:r>
-          <a:r>
-            <a:rPr lang="en-US" sz="1200" kern="1200" dirty="0" smtClean="0"/>
-            <a:t>extracted.</a:t>
+            <a:t> extracted.</a:t>
           </a:r>
           <a:endParaRPr lang="en-US" sz="1200" kern="1200" dirty="0"/>
         </a:p>
@@ -2693,9 +2622,9 @@
           <a:endParaRPr lang="en-US" sz="1200" kern="1200" dirty="0"/>
         </a:p>
       </dsp:txBody>
-      <dsp:txXfrm rot="-5400000">
-        <a:off x="3444241" y="195571"/>
-        <a:ext cx="7633027" cy="954338"/>
+      <dsp:txXfrm rot="5400000">
+        <a:off x="6757771" y="-3169586"/>
+        <a:ext cx="1057592" cy="7684654"/>
       </dsp:txXfrm>
     </dsp:sp>
     <dsp:sp modelId="{6552CB70-428D-477D-9F79-F53F633EE051}">
@@ -2771,8 +2700,8 @@
         </a:p>
       </dsp:txBody>
       <dsp:txXfrm>
-        <a:off x="943965" y="66539"/>
-        <a:ext cx="2434686" cy="1212402"/>
+        <a:off x="878377" y="951"/>
+        <a:ext cx="2565862" cy="1343578"/>
       </dsp:txXfrm>
     </dsp:sp>
     <dsp:sp modelId="{F1F6B744-2AC4-4ECE-8B41-3E8EC7938F27}">
@@ -2853,15 +2782,7 @@
           </a:r>
           <a:r>
             <a:rPr lang="en-US" sz="1200" kern="1200" dirty="0" smtClean="0"/>
-            <a:t> using the </a:t>
-          </a:r>
-          <a:r>
-            <a:rPr lang="en-US" sz="1200" kern="1200" dirty="0" smtClean="0"/>
-            <a:t>NLTK package </a:t>
-          </a:r>
-          <a:r>
-            <a:rPr lang="en-US" sz="1200" kern="1200" dirty="0" smtClean="0"/>
-            <a:t>from the user reviews.</a:t>
+            <a:t> using the NLTK package from the user reviews.</a:t>
           </a:r>
           <a:endParaRPr lang="en-US" sz="1200" kern="1200" dirty="0"/>
         </a:p>
@@ -2880,35 +2801,7 @@
           </a:pPr>
           <a:r>
             <a:rPr lang="en-US" sz="1200" kern="1200" dirty="0" smtClean="0"/>
-            <a:t>Applied Naïve Bayes </a:t>
-          </a:r>
-          <a:r>
-            <a:rPr lang="en-US" sz="1200" kern="1200" dirty="0" smtClean="0"/>
-            <a:t>using NLTK , </a:t>
-          </a:r>
-          <a:r>
-            <a:rPr lang="en-US" sz="1200" kern="1200" dirty="0" smtClean="0"/>
-            <a:t>dividing the </a:t>
-          </a:r>
-          <a:r>
-            <a:rPr lang="en-US" sz="1200" kern="1200" dirty="0" smtClean="0"/>
-            <a:t>text into </a:t>
-          </a:r>
-          <a:r>
-            <a:rPr lang="en-US" sz="1200" kern="1200" dirty="0" smtClean="0"/>
-            <a:t>positive and negative reviews </a:t>
-          </a:r>
-          <a:r>
-            <a:rPr lang="en-US" sz="1200" kern="1200" dirty="0" smtClean="0"/>
-            <a:t>based </a:t>
-          </a:r>
-          <a:r>
-            <a:rPr lang="en-US" sz="1200" kern="1200" dirty="0" smtClean="0"/>
-            <a:t>on “stars</a:t>
-          </a:r>
-          <a:r>
-            <a:rPr lang="en-US" sz="1200" kern="1200" dirty="0" smtClean="0"/>
-            <a:t>” ratings.</a:t>
+            <a:t>Applied Naïve Bayes using NLTK , dividing the text into positive and negative reviews based on “stars” ratings.</a:t>
           </a:r>
           <a:endParaRPr lang="en-US" sz="1200" kern="1200" dirty="0"/>
         </a:p>
@@ -2932,9 +2825,9 @@
           <a:endParaRPr lang="en-US" sz="1200" kern="1200" dirty="0"/>
         </a:p>
       </dsp:txBody>
-      <dsp:txXfrm rot="-5400000">
-        <a:off x="3444241" y="1633339"/>
-        <a:ext cx="7633027" cy="954338"/>
+      <dsp:txXfrm rot="5400000">
+        <a:off x="6757771" y="-1731818"/>
+        <a:ext cx="1057592" cy="7684654"/>
       </dsp:txXfrm>
     </dsp:sp>
     <dsp:sp modelId="{6359AC6B-F447-453F-BA77-6A72A16943CD}">
@@ -3010,8 +2903,8 @@
         </a:p>
       </dsp:txBody>
       <dsp:txXfrm>
-        <a:off x="943965" y="1504307"/>
-        <a:ext cx="2434686" cy="1212402"/>
+        <a:off x="878377" y="1438719"/>
+        <a:ext cx="2565862" cy="1343578"/>
       </dsp:txXfrm>
     </dsp:sp>
     <dsp:sp modelId="{310B62E1-A6E3-4BA5-A387-A18CEE005F73}">
@@ -3130,11 +3023,7 @@
           </a:pPr>
           <a:r>
             <a:rPr lang="en-US" sz="1200" kern="1200" dirty="0" smtClean="0"/>
-            <a:t>Compare </a:t>
-          </a:r>
-          <a:r>
-            <a:rPr lang="en-US" sz="1200" kern="1200" dirty="0" smtClean="0"/>
-            <a:t>the results derived from the approached mentioned above. </a:t>
+            <a:t>Compare the results derived from the approached mentioned above. </a:t>
           </a:r>
           <a:endParaRPr lang="en-US" sz="1200" kern="1200" dirty="0"/>
         </a:p>
@@ -3154,9 +3043,9 @@
           <a:endParaRPr lang="en-US" sz="1200" kern="1200" dirty="0"/>
         </a:p>
       </dsp:txBody>
-      <dsp:txXfrm rot="-5400000">
-        <a:off x="3434991" y="3071107"/>
-        <a:ext cx="7633027" cy="954338"/>
+      <dsp:txXfrm rot="5400000">
+        <a:off x="6748521" y="-294050"/>
+        <a:ext cx="1057592" cy="7684654"/>
       </dsp:txXfrm>
     </dsp:sp>
     <dsp:sp modelId="{CF0ED83B-A46B-4B44-9C69-22DECEFDEE5C}">
@@ -3232,8 +3121,8 @@
         </a:p>
       </dsp:txBody>
       <dsp:txXfrm>
-        <a:off x="943965" y="2942075"/>
-        <a:ext cx="2434686" cy="1212402"/>
+        <a:off x="878377" y="2876487"/>
+        <a:ext cx="2565862" cy="1343578"/>
       </dsp:txXfrm>
     </dsp:sp>
   </dsp:spTree>
@@ -3241,7 +3130,7 @@
 </file>
 
 <file path=ppt/diagrams/drawing2.xml><?xml version="1.0" encoding="utf-8"?>
-<dsp:drawing xmlns:dgm="http://schemas.openxmlformats.org/drawingml/2006/diagram" xmlns:dsp="http://schemas.microsoft.com/office/drawing/2008/diagram" xmlns:a="http://schemas.openxmlformats.org/drawingml/2006/main">
+<dsp:drawing xmlns:dgm="http://schemas.openxmlformats.org/drawingml/2006/diagram" xmlns:a="http://schemas.openxmlformats.org/drawingml/2006/main" xmlns:dsp="http://schemas.microsoft.com/office/drawing/2008/diagram">
   <dsp:spTree>
     <dsp:nvGrpSpPr>
       <dsp:cNvPr id="0" name=""/>
@@ -6059,6 +5948,7 @@
           <a:p>
             <a:fld id="{74942356-FC19-44E1-A209-AB2705A40D0F}" type="datetimeFigureOut">
               <a:rPr lang="en-US" smtClean="0"/>
+              <a:pPr/>
               <a:t>5/8/2016</a:t>
             </a:fld>
             <a:endParaRPr lang="en-US"/>
@@ -6218,6 +6108,7 @@
           <a:p>
             <a:fld id="{E91E85BC-7FCF-4E60-849B-D3E043A25CD4}" type="slidenum">
               <a:rPr lang="en-US" smtClean="0"/>
+              <a:pPr/>
               <a:t>‹#›</a:t>
             </a:fld>
             <a:endParaRPr lang="en-US"/>
@@ -6227,7 +6118,7 @@
     </p:spTree>
     <p:extLst>
       <p:ext uri="{BB962C8B-B14F-4D97-AF65-F5344CB8AC3E}">
-        <p14:creationId xmlns:p14="http://schemas.microsoft.com/office/powerpoint/2010/main" val="4177637650"/>
+        <p14:creationId xmlns:p14="http://schemas.microsoft.com/office/powerpoint/2010/main" xmlns="" val="4177637650"/>
       </p:ext>
     </p:extLst>
   </p:cSld>
@@ -6392,6 +6283,7 @@
           <a:p>
             <a:fld id="{E91E85BC-7FCF-4E60-849B-D3E043A25CD4}" type="slidenum">
               <a:rPr lang="en-US" smtClean="0"/>
+              <a:pPr/>
               <a:t>2</a:t>
             </a:fld>
             <a:endParaRPr lang="en-US"/>
@@ -6401,7 +6293,7 @@
     </p:spTree>
     <p:extLst>
       <p:ext uri="{BB962C8B-B14F-4D97-AF65-F5344CB8AC3E}">
-        <p14:creationId xmlns:p14="http://schemas.microsoft.com/office/powerpoint/2010/main" val="3918197074"/>
+        <p14:creationId xmlns:p14="http://schemas.microsoft.com/office/powerpoint/2010/main" xmlns="" val="3918197074"/>
       </p:ext>
     </p:extLst>
   </p:cSld>
@@ -6440,7 +6332,7 @@
           <a:blip r:embed="rId2">
             <a:extLst>
               <a:ext uri="{28A0092B-C50C-407E-A947-70E740481C1C}">
-                <a14:useLocalDpi xmlns:a14="http://schemas.microsoft.com/office/drawing/2010/main" val="0"/>
+                <a14:useLocalDpi xmlns:a14="http://schemas.microsoft.com/office/drawing/2010/main" xmlns="" val="0"/>
               </a:ext>
             </a:extLst>
           </a:blip>
@@ -6470,7 +6362,7 @@
           <a:blip r:embed="rId3">
             <a:extLst>
               <a:ext uri="{28A0092B-C50C-407E-A947-70E740481C1C}">
-                <a14:useLocalDpi xmlns:a14="http://schemas.microsoft.com/office/drawing/2010/main" val="0"/>
+                <a14:useLocalDpi xmlns:a14="http://schemas.microsoft.com/office/drawing/2010/main" xmlns="" val="0"/>
               </a:ext>
             </a:extLst>
           </a:blip>
@@ -6685,6 +6577,7 @@
           <a:p>
             <a:fld id="{808B14FD-7952-4FEB-8225-02F4B271734D}" type="datetime1">
               <a:rPr lang="en-US" smtClean="0"/>
+              <a:pPr/>
               <a:t>5/8/2016</a:t>
             </a:fld>
             <a:endParaRPr lang="en-US" dirty="0"/>
@@ -6742,7 +6635,7 @@
     </p:spTree>
     <p:extLst>
       <p:ext uri="{BB962C8B-B14F-4D97-AF65-F5344CB8AC3E}">
-        <p14:creationId xmlns:p14="http://schemas.microsoft.com/office/powerpoint/2010/main" val="4279745460"/>
+        <p14:creationId xmlns:p14="http://schemas.microsoft.com/office/powerpoint/2010/main" xmlns="" val="4279745460"/>
       </p:ext>
     </p:extLst>
   </p:cSld>
@@ -6781,7 +6674,7 @@
           <a:blip r:embed="rId2">
             <a:extLst>
               <a:ext uri="{28A0092B-C50C-407E-A947-70E740481C1C}">
-                <a14:useLocalDpi xmlns:a14="http://schemas.microsoft.com/office/drawing/2010/main" val="0"/>
+                <a14:useLocalDpi xmlns:a14="http://schemas.microsoft.com/office/drawing/2010/main" xmlns="" val="0"/>
               </a:ext>
             </a:extLst>
           </a:blip>
@@ -6811,7 +6704,7 @@
           <a:blip r:embed="rId3">
             <a:extLst>
               <a:ext uri="{28A0092B-C50C-407E-A947-70E740481C1C}">
-                <a14:useLocalDpi xmlns:a14="http://schemas.microsoft.com/office/drawing/2010/main" val="0"/>
+                <a14:useLocalDpi xmlns:a14="http://schemas.microsoft.com/office/drawing/2010/main" xmlns="" val="0"/>
               </a:ext>
             </a:extLst>
           </a:blip>
@@ -7100,6 +6993,7 @@
           <a:p>
             <a:fld id="{AF0B0C39-D9D3-4409-8CFD-052AFB94E8FB}" type="datetime1">
               <a:rPr lang="en-US" smtClean="0"/>
+              <a:pPr/>
               <a:t>5/8/2016</a:t>
             </a:fld>
             <a:endParaRPr lang="en-US" dirty="0"/>
@@ -7157,7 +7051,7 @@
     </p:spTree>
     <p:extLst>
       <p:ext uri="{BB962C8B-B14F-4D97-AF65-F5344CB8AC3E}">
-        <p14:creationId xmlns:p14="http://schemas.microsoft.com/office/powerpoint/2010/main" val="1365188427"/>
+        <p14:creationId xmlns:p14="http://schemas.microsoft.com/office/powerpoint/2010/main" xmlns="" val="1365188427"/>
       </p:ext>
     </p:extLst>
   </p:cSld>
@@ -7196,7 +7090,7 @@
           <a:blip r:embed="rId2">
             <a:extLst>
               <a:ext uri="{28A0092B-C50C-407E-A947-70E740481C1C}">
-                <a14:useLocalDpi xmlns:a14="http://schemas.microsoft.com/office/drawing/2010/main" val="0"/>
+                <a14:useLocalDpi xmlns:a14="http://schemas.microsoft.com/office/drawing/2010/main" xmlns="" val="0"/>
               </a:ext>
             </a:extLst>
           </a:blip>
@@ -7226,7 +7120,7 @@
           <a:blip r:embed="rId3">
             <a:extLst>
               <a:ext uri="{28A0092B-C50C-407E-A947-70E740481C1C}">
-                <a14:useLocalDpi xmlns:a14="http://schemas.microsoft.com/office/drawing/2010/main" val="0"/>
+                <a14:useLocalDpi xmlns:a14="http://schemas.microsoft.com/office/drawing/2010/main" xmlns="" val="0"/>
               </a:ext>
             </a:extLst>
           </a:blip>
@@ -7437,6 +7331,7 @@
           <a:p>
             <a:fld id="{4AF9F0DB-7369-48FC-BC8A-B841878D5540}" type="datetime1">
               <a:rPr lang="en-US" smtClean="0"/>
+              <a:pPr/>
               <a:t>5/8/2016</a:t>
             </a:fld>
             <a:endParaRPr lang="en-US" dirty="0"/>
@@ -7494,7 +7389,7 @@
     </p:spTree>
     <p:extLst>
       <p:ext uri="{BB962C8B-B14F-4D97-AF65-F5344CB8AC3E}">
-        <p14:creationId xmlns:p14="http://schemas.microsoft.com/office/powerpoint/2010/main" val="1802782155"/>
+        <p14:creationId xmlns:p14="http://schemas.microsoft.com/office/powerpoint/2010/main" xmlns="" val="1802782155"/>
       </p:ext>
     </p:extLst>
   </p:cSld>
@@ -7533,7 +7428,7 @@
           <a:blip r:embed="rId2">
             <a:extLst>
               <a:ext uri="{28A0092B-C50C-407E-A947-70E740481C1C}">
-                <a14:useLocalDpi xmlns:a14="http://schemas.microsoft.com/office/drawing/2010/main" val="0"/>
+                <a14:useLocalDpi xmlns:a14="http://schemas.microsoft.com/office/drawing/2010/main" xmlns="" val="0"/>
               </a:ext>
             </a:extLst>
           </a:blip>
@@ -7563,7 +7458,7 @@
           <a:blip r:embed="rId3">
             <a:extLst>
               <a:ext uri="{28A0092B-C50C-407E-A947-70E740481C1C}">
-                <a14:useLocalDpi xmlns:a14="http://schemas.microsoft.com/office/drawing/2010/main" val="0"/>
+                <a14:useLocalDpi xmlns:a14="http://schemas.microsoft.com/office/drawing/2010/main" xmlns="" val="0"/>
               </a:ext>
             </a:extLst>
           </a:blip>
@@ -7843,6 +7738,7 @@
           <a:p>
             <a:fld id="{E87DAA21-435E-4948-B2CD-68332BEB47B3}" type="datetime1">
               <a:rPr lang="en-US" smtClean="0"/>
+              <a:pPr/>
               <a:t>5/8/2016</a:t>
             </a:fld>
             <a:endParaRPr lang="en-US" dirty="0"/>
@@ -8132,7 +8028,7 @@
     </p:spTree>
     <p:extLst>
       <p:ext uri="{BB962C8B-B14F-4D97-AF65-F5344CB8AC3E}">
-        <p14:creationId xmlns:p14="http://schemas.microsoft.com/office/powerpoint/2010/main" val="2632013106"/>
+        <p14:creationId xmlns:p14="http://schemas.microsoft.com/office/powerpoint/2010/main" xmlns="" val="2632013106"/>
       </p:ext>
     </p:extLst>
   </p:cSld>
@@ -8171,7 +8067,7 @@
           <a:blip r:embed="rId2">
             <a:extLst>
               <a:ext uri="{28A0092B-C50C-407E-A947-70E740481C1C}">
-                <a14:useLocalDpi xmlns:a14="http://schemas.microsoft.com/office/drawing/2010/main" val="0"/>
+                <a14:useLocalDpi xmlns:a14="http://schemas.microsoft.com/office/drawing/2010/main" xmlns="" val="0"/>
               </a:ext>
             </a:extLst>
           </a:blip>
@@ -8201,7 +8097,7 @@
           <a:blip r:embed="rId3">
             <a:extLst>
               <a:ext uri="{28A0092B-C50C-407E-A947-70E740481C1C}">
-                <a14:useLocalDpi xmlns:a14="http://schemas.microsoft.com/office/drawing/2010/main" val="0"/>
+                <a14:useLocalDpi xmlns:a14="http://schemas.microsoft.com/office/drawing/2010/main" xmlns="" val="0"/>
               </a:ext>
             </a:extLst>
           </a:blip>
@@ -8412,6 +8308,7 @@
           <a:p>
             <a:fld id="{31572F71-A590-4820-A017-A338A9931AB3}" type="datetime1">
               <a:rPr lang="en-US" smtClean="0"/>
+              <a:pPr/>
               <a:t>5/8/2016</a:t>
             </a:fld>
             <a:endParaRPr lang="en-US" dirty="0"/>
@@ -8469,7 +8366,7 @@
     </p:spTree>
     <p:extLst>
       <p:ext uri="{BB962C8B-B14F-4D97-AF65-F5344CB8AC3E}">
-        <p14:creationId xmlns:p14="http://schemas.microsoft.com/office/powerpoint/2010/main" val="1270246781"/>
+        <p14:creationId xmlns:p14="http://schemas.microsoft.com/office/powerpoint/2010/main" xmlns="" val="1270246781"/>
       </p:ext>
     </p:extLst>
   </p:cSld>
@@ -8508,7 +8405,7 @@
           <a:blip r:embed="rId2">
             <a:extLst>
               <a:ext uri="{28A0092B-C50C-407E-A947-70E740481C1C}">
-                <a14:useLocalDpi xmlns:a14="http://schemas.microsoft.com/office/drawing/2010/main" val="0"/>
+                <a14:useLocalDpi xmlns:a14="http://schemas.microsoft.com/office/drawing/2010/main" xmlns="" val="0"/>
               </a:ext>
             </a:extLst>
           </a:blip>
@@ -8538,7 +8435,7 @@
           <a:blip r:embed="rId3">
             <a:extLst>
               <a:ext uri="{28A0092B-C50C-407E-A947-70E740481C1C}">
-                <a14:useLocalDpi xmlns:a14="http://schemas.microsoft.com/office/drawing/2010/main" val="0"/>
+                <a14:useLocalDpi xmlns:a14="http://schemas.microsoft.com/office/drawing/2010/main" xmlns="" val="0"/>
               </a:ext>
             </a:extLst>
           </a:blip>
@@ -9094,6 +8991,7 @@
           <a:p>
             <a:fld id="{B85BA1BA-E59A-4CC9-BE18-974D5D100127}" type="datetime1">
               <a:rPr lang="en-US" smtClean="0"/>
+              <a:pPr/>
               <a:t>5/8/2016</a:t>
             </a:fld>
             <a:endParaRPr lang="en-US" dirty="0"/>
@@ -9146,7 +9044,7 @@
     </p:spTree>
     <p:extLst>
       <p:ext uri="{BB962C8B-B14F-4D97-AF65-F5344CB8AC3E}">
-        <p14:creationId xmlns:p14="http://schemas.microsoft.com/office/powerpoint/2010/main" val="1034984238"/>
+        <p14:creationId xmlns:p14="http://schemas.microsoft.com/office/powerpoint/2010/main" xmlns="" val="1034984238"/>
       </p:ext>
     </p:extLst>
   </p:cSld>
@@ -9185,7 +9083,7 @@
           <a:blip r:embed="rId2">
             <a:extLst>
               <a:ext uri="{28A0092B-C50C-407E-A947-70E740481C1C}">
-                <a14:useLocalDpi xmlns:a14="http://schemas.microsoft.com/office/drawing/2010/main" val="0"/>
+                <a14:useLocalDpi xmlns:a14="http://schemas.microsoft.com/office/drawing/2010/main" xmlns="" val="0"/>
               </a:ext>
             </a:extLst>
           </a:blip>
@@ -9215,7 +9113,7 @@
           <a:blip r:embed="rId3">
             <a:extLst>
               <a:ext uri="{28A0092B-C50C-407E-A947-70E740481C1C}">
-                <a14:useLocalDpi xmlns:a14="http://schemas.microsoft.com/office/drawing/2010/main" val="0"/>
+                <a14:useLocalDpi xmlns:a14="http://schemas.microsoft.com/office/drawing/2010/main" xmlns="" val="0"/>
               </a:ext>
             </a:extLst>
           </a:blip>
@@ -10008,6 +9906,7 @@
           <a:p>
             <a:fld id="{0B483EC2-ACE1-4446-8935-4A110F4EF24B}" type="datetime1">
               <a:rPr lang="en-US" smtClean="0"/>
+              <a:pPr/>
               <a:t>5/8/2016</a:t>
             </a:fld>
             <a:endParaRPr lang="en-US" dirty="0"/>
@@ -10060,7 +9959,7 @@
     </p:spTree>
     <p:extLst>
       <p:ext uri="{BB962C8B-B14F-4D97-AF65-F5344CB8AC3E}">
-        <p14:creationId xmlns:p14="http://schemas.microsoft.com/office/powerpoint/2010/main" val="3073365457"/>
+        <p14:creationId xmlns:p14="http://schemas.microsoft.com/office/powerpoint/2010/main" xmlns="" val="3073365457"/>
       </p:ext>
     </p:extLst>
   </p:cSld>
@@ -10099,7 +9998,7 @@
           <a:blip r:embed="rId2">
             <a:extLst>
               <a:ext uri="{28A0092B-C50C-407E-A947-70E740481C1C}">
-                <a14:useLocalDpi xmlns:a14="http://schemas.microsoft.com/office/drawing/2010/main" val="0"/>
+                <a14:useLocalDpi xmlns:a14="http://schemas.microsoft.com/office/drawing/2010/main" xmlns="" val="0"/>
               </a:ext>
             </a:extLst>
           </a:blip>
@@ -10129,7 +10028,7 @@
           <a:blip r:embed="rId3">
             <a:extLst>
               <a:ext uri="{28A0092B-C50C-407E-A947-70E740481C1C}">
-                <a14:useLocalDpi xmlns:a14="http://schemas.microsoft.com/office/drawing/2010/main" val="0"/>
+                <a14:useLocalDpi xmlns:a14="http://schemas.microsoft.com/office/drawing/2010/main" xmlns="" val="0"/>
               </a:ext>
             </a:extLst>
           </a:blip>
@@ -10322,6 +10221,7 @@
           <a:p>
             <a:fld id="{08B65304-D6EF-45EB-9DDE-89F6BDC093E9}" type="datetime1">
               <a:rPr lang="en-US" smtClean="0"/>
+              <a:pPr/>
               <a:t>5/8/2016</a:t>
             </a:fld>
             <a:endParaRPr lang="en-US" dirty="0"/>
@@ -10374,7 +10274,7 @@
     </p:spTree>
     <p:extLst>
       <p:ext uri="{BB962C8B-B14F-4D97-AF65-F5344CB8AC3E}">
-        <p14:creationId xmlns:p14="http://schemas.microsoft.com/office/powerpoint/2010/main" val="2463211408"/>
+        <p14:creationId xmlns:p14="http://schemas.microsoft.com/office/powerpoint/2010/main" xmlns="" val="2463211408"/>
       </p:ext>
     </p:extLst>
   </p:cSld>
@@ -10587,6 +10487,7 @@
           <a:p>
             <a:fld id="{62C13344-05D4-45E8-B005-97FAA02F4679}" type="datetime1">
               <a:rPr lang="en-US" smtClean="0"/>
+              <a:pPr/>
               <a:t>5/8/2016</a:t>
             </a:fld>
             <a:endParaRPr lang="en-US" dirty="0"/>
@@ -10653,7 +10554,7 @@
     </p:spTree>
     <p:extLst>
       <p:ext uri="{BB962C8B-B14F-4D97-AF65-F5344CB8AC3E}">
-        <p14:creationId xmlns:p14="http://schemas.microsoft.com/office/powerpoint/2010/main" val="3652044440"/>
+        <p14:creationId xmlns:p14="http://schemas.microsoft.com/office/powerpoint/2010/main" xmlns="" val="3652044440"/>
       </p:ext>
     </p:extLst>
   </p:cSld>
@@ -10692,7 +10593,7 @@
           <a:blip r:embed="rId2">
             <a:extLst>
               <a:ext uri="{28A0092B-C50C-407E-A947-70E740481C1C}">
-                <a14:useLocalDpi xmlns:a14="http://schemas.microsoft.com/office/drawing/2010/main" val="0"/>
+                <a14:useLocalDpi xmlns:a14="http://schemas.microsoft.com/office/drawing/2010/main" xmlns="" val="0"/>
               </a:ext>
             </a:extLst>
           </a:blip>
@@ -10722,7 +10623,7 @@
           <a:blip r:embed="rId3">
             <a:extLst>
               <a:ext uri="{28A0092B-C50C-407E-A947-70E740481C1C}">
-                <a14:useLocalDpi xmlns:a14="http://schemas.microsoft.com/office/drawing/2010/main" val="0"/>
+                <a14:useLocalDpi xmlns:a14="http://schemas.microsoft.com/office/drawing/2010/main" xmlns="" val="0"/>
               </a:ext>
             </a:extLst>
           </a:blip>
@@ -10911,6 +10812,7 @@
           <a:p>
             <a:fld id="{79FB67B7-BA78-4402-AB29-F0393FCEB403}" type="datetime1">
               <a:rPr lang="en-US" smtClean="0"/>
+              <a:pPr/>
               <a:t>5/8/2016</a:t>
             </a:fld>
             <a:endParaRPr lang="en-US" dirty="0"/>
@@ -10963,7 +10865,7 @@
     </p:spTree>
     <p:extLst>
       <p:ext uri="{BB962C8B-B14F-4D97-AF65-F5344CB8AC3E}">
-        <p14:creationId xmlns:p14="http://schemas.microsoft.com/office/powerpoint/2010/main" val="3600362395"/>
+        <p14:creationId xmlns:p14="http://schemas.microsoft.com/office/powerpoint/2010/main" xmlns="" val="3600362395"/>
       </p:ext>
     </p:extLst>
   </p:cSld>
@@ -11002,7 +10904,7 @@
           <a:blip r:embed="rId2">
             <a:extLst>
               <a:ext uri="{28A0092B-C50C-407E-A947-70E740481C1C}">
-                <a14:useLocalDpi xmlns:a14="http://schemas.microsoft.com/office/drawing/2010/main" val="0"/>
+                <a14:useLocalDpi xmlns:a14="http://schemas.microsoft.com/office/drawing/2010/main" xmlns="" val="0"/>
               </a:ext>
             </a:extLst>
           </a:blip>
@@ -11032,7 +10934,7 @@
           <a:blip r:embed="rId3">
             <a:extLst>
               <a:ext uri="{28A0092B-C50C-407E-A947-70E740481C1C}">
-                <a14:useLocalDpi xmlns:a14="http://schemas.microsoft.com/office/drawing/2010/main" val="0"/>
+                <a14:useLocalDpi xmlns:a14="http://schemas.microsoft.com/office/drawing/2010/main" xmlns="" val="0"/>
               </a:ext>
             </a:extLst>
           </a:blip>
@@ -11301,6 +11203,7 @@
           <a:p>
             <a:fld id="{FDE5B7BB-DDD6-4C80-8C8F-F00A0E39515B}" type="datetime1">
               <a:rPr lang="en-US" smtClean="0"/>
+              <a:pPr/>
               <a:t>5/8/2016</a:t>
             </a:fld>
             <a:endParaRPr lang="en-US" dirty="0"/>
@@ -11358,7 +11261,7 @@
     </p:spTree>
     <p:extLst>
       <p:ext uri="{BB962C8B-B14F-4D97-AF65-F5344CB8AC3E}">
-        <p14:creationId xmlns:p14="http://schemas.microsoft.com/office/powerpoint/2010/main" val="296294326"/>
+        <p14:creationId xmlns:p14="http://schemas.microsoft.com/office/powerpoint/2010/main" xmlns="" val="296294326"/>
       </p:ext>
     </p:extLst>
   </p:cSld>
@@ -11397,7 +11300,7 @@
           <a:blip r:embed="rId2">
             <a:extLst>
               <a:ext uri="{28A0092B-C50C-407E-A947-70E740481C1C}">
-                <a14:useLocalDpi xmlns:a14="http://schemas.microsoft.com/office/drawing/2010/main" val="0"/>
+                <a14:useLocalDpi xmlns:a14="http://schemas.microsoft.com/office/drawing/2010/main" xmlns="" val="0"/>
               </a:ext>
             </a:extLst>
           </a:blip>
@@ -11427,7 +11330,7 @@
           <a:blip r:embed="rId3">
             <a:extLst>
               <a:ext uri="{28A0092B-C50C-407E-A947-70E740481C1C}">
-                <a14:useLocalDpi xmlns:a14="http://schemas.microsoft.com/office/drawing/2010/main" val="0"/>
+                <a14:useLocalDpi xmlns:a14="http://schemas.microsoft.com/office/drawing/2010/main" xmlns="" val="0"/>
               </a:ext>
             </a:extLst>
           </a:blip>
@@ -11678,6 +11581,7 @@
           <a:p>
             <a:fld id="{22A989D5-6998-4B2E-B6CC-76C2782E9786}" type="datetime1">
               <a:rPr lang="en-US" smtClean="0"/>
+              <a:pPr/>
               <a:t>5/8/2016</a:t>
             </a:fld>
             <a:endParaRPr lang="en-US" dirty="0"/>
@@ -11730,7 +11634,7 @@
     </p:spTree>
     <p:extLst>
       <p:ext uri="{BB962C8B-B14F-4D97-AF65-F5344CB8AC3E}">
-        <p14:creationId xmlns:p14="http://schemas.microsoft.com/office/powerpoint/2010/main" val="985643105"/>
+        <p14:creationId xmlns:p14="http://schemas.microsoft.com/office/powerpoint/2010/main" xmlns="" val="985643105"/>
       </p:ext>
     </p:extLst>
   </p:cSld>
@@ -11769,7 +11673,7 @@
           <a:blip r:embed="rId2">
             <a:extLst>
               <a:ext uri="{28A0092B-C50C-407E-A947-70E740481C1C}">
-                <a14:useLocalDpi xmlns:a14="http://schemas.microsoft.com/office/drawing/2010/main" val="0"/>
+                <a14:useLocalDpi xmlns:a14="http://schemas.microsoft.com/office/drawing/2010/main" xmlns="" val="0"/>
               </a:ext>
             </a:extLst>
           </a:blip>
@@ -11799,7 +11703,7 @@
           <a:blip r:embed="rId3">
             <a:extLst>
               <a:ext uri="{28A0092B-C50C-407E-A947-70E740481C1C}">
-                <a14:useLocalDpi xmlns:a14="http://schemas.microsoft.com/office/drawing/2010/main" val="0"/>
+                <a14:useLocalDpi xmlns:a14="http://schemas.microsoft.com/office/drawing/2010/main" xmlns="" val="0"/>
               </a:ext>
             </a:extLst>
           </a:blip>
@@ -12185,6 +12089,7 @@
           <a:p>
             <a:fld id="{D6B5A9E3-3DB6-4B8C-B734-A80A9570B6D1}" type="datetime1">
               <a:rPr lang="en-US" smtClean="0"/>
+              <a:pPr/>
               <a:t>5/8/2016</a:t>
             </a:fld>
             <a:endParaRPr lang="en-US" dirty="0"/>
@@ -12237,7 +12142,7 @@
     </p:spTree>
     <p:extLst>
       <p:ext uri="{BB962C8B-B14F-4D97-AF65-F5344CB8AC3E}">
-        <p14:creationId xmlns:p14="http://schemas.microsoft.com/office/powerpoint/2010/main" val="1842823829"/>
+        <p14:creationId xmlns:p14="http://schemas.microsoft.com/office/powerpoint/2010/main" xmlns="" val="1842823829"/>
       </p:ext>
     </p:extLst>
   </p:cSld>
@@ -12276,7 +12181,7 @@
           <a:blip r:embed="rId2">
             <a:extLst>
               <a:ext uri="{28A0092B-C50C-407E-A947-70E740481C1C}">
-                <a14:useLocalDpi xmlns:a14="http://schemas.microsoft.com/office/drawing/2010/main" val="0"/>
+                <a14:useLocalDpi xmlns:a14="http://schemas.microsoft.com/office/drawing/2010/main" xmlns="" val="0"/>
               </a:ext>
             </a:extLst>
           </a:blip>
@@ -12306,7 +12211,7 @@
           <a:blip r:embed="rId3">
             <a:extLst>
               <a:ext uri="{28A0092B-C50C-407E-A947-70E740481C1C}">
-                <a14:useLocalDpi xmlns:a14="http://schemas.microsoft.com/office/drawing/2010/main" val="0"/>
+                <a14:useLocalDpi xmlns:a14="http://schemas.microsoft.com/office/drawing/2010/main" xmlns="" val="0"/>
               </a:ext>
             </a:extLst>
           </a:blip>
@@ -12443,6 +12348,7 @@
           <a:p>
             <a:fld id="{8FB9EAEC-DD95-4289-97EF-32C3F975DEA4}" type="datetime1">
               <a:rPr lang="en-US" smtClean="0"/>
+              <a:pPr/>
               <a:t>5/8/2016</a:t>
             </a:fld>
             <a:endParaRPr lang="en-US" dirty="0"/>
@@ -12495,7 +12401,7 @@
     </p:spTree>
     <p:extLst>
       <p:ext uri="{BB962C8B-B14F-4D97-AF65-F5344CB8AC3E}">
-        <p14:creationId xmlns:p14="http://schemas.microsoft.com/office/powerpoint/2010/main" val="3361219684"/>
+        <p14:creationId xmlns:p14="http://schemas.microsoft.com/office/powerpoint/2010/main" xmlns="" val="3361219684"/>
       </p:ext>
     </p:extLst>
   </p:cSld>
@@ -12534,7 +12440,7 @@
           <a:blip r:embed="rId2">
             <a:extLst>
               <a:ext uri="{28A0092B-C50C-407E-A947-70E740481C1C}">
-                <a14:useLocalDpi xmlns:a14="http://schemas.microsoft.com/office/drawing/2010/main" val="0"/>
+                <a14:useLocalDpi xmlns:a14="http://schemas.microsoft.com/office/drawing/2010/main" xmlns="" val="0"/>
               </a:ext>
             </a:extLst>
           </a:blip>
@@ -12607,6 +12513,7 @@
           <a:p>
             <a:fld id="{9759F0B2-E20A-4C42-930F-CB4088FA474E}" type="datetime1">
               <a:rPr lang="en-US" smtClean="0"/>
+              <a:pPr/>
               <a:t>5/8/2016</a:t>
             </a:fld>
             <a:endParaRPr lang="en-US" dirty="0"/>
@@ -12659,7 +12566,7 @@
     </p:spTree>
     <p:extLst>
       <p:ext uri="{BB962C8B-B14F-4D97-AF65-F5344CB8AC3E}">
-        <p14:creationId xmlns:p14="http://schemas.microsoft.com/office/powerpoint/2010/main" val="1029353674"/>
+        <p14:creationId xmlns:p14="http://schemas.microsoft.com/office/powerpoint/2010/main" xmlns="" val="1029353674"/>
       </p:ext>
     </p:extLst>
   </p:cSld>
@@ -12698,7 +12605,7 @@
           <a:blip r:embed="rId2">
             <a:extLst>
               <a:ext uri="{28A0092B-C50C-407E-A947-70E740481C1C}">
-                <a14:useLocalDpi xmlns:a14="http://schemas.microsoft.com/office/drawing/2010/main" val="0"/>
+                <a14:useLocalDpi xmlns:a14="http://schemas.microsoft.com/office/drawing/2010/main" xmlns="" val="0"/>
               </a:ext>
             </a:extLst>
           </a:blip>
@@ -12728,7 +12635,7 @@
           <a:blip r:embed="rId3">
             <a:extLst>
               <a:ext uri="{28A0092B-C50C-407E-A947-70E740481C1C}">
-                <a14:useLocalDpi xmlns:a14="http://schemas.microsoft.com/office/drawing/2010/main" val="0"/>
+                <a14:useLocalDpi xmlns:a14="http://schemas.microsoft.com/office/drawing/2010/main" xmlns="" val="0"/>
               </a:ext>
             </a:extLst>
           </a:blip>
@@ -12998,6 +12905,7 @@
           <a:p>
             <a:fld id="{317F382D-96EB-4D34-B7C4-12F6A3298E55}" type="datetime1">
               <a:rPr lang="en-US" smtClean="0"/>
+              <a:pPr/>
               <a:t>5/8/2016</a:t>
             </a:fld>
             <a:endParaRPr lang="en-US" dirty="0"/>
@@ -13050,7 +12958,7 @@
     </p:spTree>
     <p:extLst>
       <p:ext uri="{BB962C8B-B14F-4D97-AF65-F5344CB8AC3E}">
-        <p14:creationId xmlns:p14="http://schemas.microsoft.com/office/powerpoint/2010/main" val="3441022955"/>
+        <p14:creationId xmlns:p14="http://schemas.microsoft.com/office/powerpoint/2010/main" xmlns="" val="3441022955"/>
       </p:ext>
     </p:extLst>
   </p:cSld>
@@ -13089,7 +12997,7 @@
           <a:blip r:embed="rId2">
             <a:extLst>
               <a:ext uri="{28A0092B-C50C-407E-A947-70E740481C1C}">
-                <a14:useLocalDpi xmlns:a14="http://schemas.microsoft.com/office/drawing/2010/main" val="0"/>
+                <a14:useLocalDpi xmlns:a14="http://schemas.microsoft.com/office/drawing/2010/main" xmlns="" val="0"/>
               </a:ext>
             </a:extLst>
           </a:blip>
@@ -13119,7 +13027,7 @@
           <a:blip r:embed="rId3">
             <a:extLst>
               <a:ext uri="{28A0092B-C50C-407E-A947-70E740481C1C}">
-                <a14:useLocalDpi xmlns:a14="http://schemas.microsoft.com/office/drawing/2010/main" val="0"/>
+                <a14:useLocalDpi xmlns:a14="http://schemas.microsoft.com/office/drawing/2010/main" xmlns="" val="0"/>
               </a:ext>
             </a:extLst>
           </a:blip>
@@ -13408,6 +13316,7 @@
           <a:p>
             <a:fld id="{423A87D3-976E-452F-B5FA-27F91C522170}" type="datetime1">
               <a:rPr lang="en-US" smtClean="0"/>
+              <a:pPr/>
               <a:t>5/8/2016</a:t>
             </a:fld>
             <a:endParaRPr lang="en-US" dirty="0"/>
@@ -13460,7 +13369,7 @@
     </p:spTree>
     <p:extLst>
       <p:ext uri="{BB962C8B-B14F-4D97-AF65-F5344CB8AC3E}">
-        <p14:creationId xmlns:p14="http://schemas.microsoft.com/office/powerpoint/2010/main" val="84176941"/>
+        <p14:creationId xmlns:p14="http://schemas.microsoft.com/office/powerpoint/2010/main" xmlns="" val="84176941"/>
       </p:ext>
     </p:extLst>
   </p:cSld>
@@ -13505,7 +13414,7 @@
             <a:alphaModFix amt="10000"/>
             <a:extLst>
               <a:ext uri="{28A0092B-C50C-407E-A947-70E740481C1C}">
-                <a14:useLocalDpi xmlns:a14="http://schemas.microsoft.com/office/drawing/2010/main" val="0"/>
+                <a14:useLocalDpi xmlns:a14="http://schemas.microsoft.com/office/drawing/2010/main" xmlns="" val="0"/>
               </a:ext>
             </a:extLst>
           </a:blip>
@@ -13653,6 +13562,7 @@
           <a:p>
             <a:fld id="{40DCCA02-BCA4-4CBA-8E5E-2E8CC25E61D5}" type="datetime1">
               <a:rPr lang="en-US" smtClean="0"/>
+              <a:pPr/>
               <a:t>5/8/2016</a:t>
             </a:fld>
             <a:endParaRPr lang="en-US" dirty="0"/>
@@ -13741,7 +13651,7 @@
     </p:spTree>
     <p:extLst>
       <p:ext uri="{BB962C8B-B14F-4D97-AF65-F5344CB8AC3E}">
-        <p14:creationId xmlns:p14="http://schemas.microsoft.com/office/powerpoint/2010/main" val="3973047683"/>
+        <p14:creationId xmlns:p14="http://schemas.microsoft.com/office/powerpoint/2010/main" xmlns="" val="3973047683"/>
       </p:ext>
     </p:extLst>
   </p:cSld>
@@ -14113,15 +14023,7 @@
           <a:p>
             <a:r>
               <a:rPr lang="en-US" dirty="0" smtClean="0"/>
-              <a:t>A CS223 </a:t>
-            </a:r>
-            <a:r>
-              <a:rPr lang="en-US" dirty="0" smtClean="0"/>
-              <a:t>Class </a:t>
-            </a:r>
-            <a:r>
-              <a:rPr lang="en-US" dirty="0" smtClean="0"/>
-              <a:t>Project</a:t>
+              <a:t>A CS223 Class Project</a:t>
             </a:r>
           </a:p>
           <a:p>
@@ -14374,7 +14276,7 @@
     </p:spTree>
     <p:extLst>
       <p:ext uri="{BB962C8B-B14F-4D97-AF65-F5344CB8AC3E}">
-        <p14:creationId xmlns:p14="http://schemas.microsoft.com/office/powerpoint/2010/main" val="1500833825"/>
+        <p14:creationId xmlns:p14="http://schemas.microsoft.com/office/powerpoint/2010/main" xmlns="" val="1500833825"/>
       </p:ext>
     </p:extLst>
   </p:cSld>
@@ -14570,7 +14472,7 @@
     </p:spTree>
     <p:extLst>
       <p:ext uri="{BB962C8B-B14F-4D97-AF65-F5344CB8AC3E}">
-        <p14:creationId xmlns:p14="http://schemas.microsoft.com/office/powerpoint/2010/main" val="509569423"/>
+        <p14:creationId xmlns:p14="http://schemas.microsoft.com/office/powerpoint/2010/main" xmlns="" val="509569423"/>
       </p:ext>
     </p:extLst>
   </p:cSld>
@@ -14738,7 +14640,7 @@
     </p:spTree>
     <p:extLst>
       <p:ext uri="{BB962C8B-B14F-4D97-AF65-F5344CB8AC3E}">
-        <p14:creationId xmlns:p14="http://schemas.microsoft.com/office/powerpoint/2010/main" val="2940507242"/>
+        <p14:creationId xmlns:p14="http://schemas.microsoft.com/office/powerpoint/2010/main" xmlns="" val="2940507242"/>
       </p:ext>
     </p:extLst>
   </p:cSld>
@@ -15034,7 +14936,7 @@
     </p:spTree>
     <p:extLst>
       <p:ext uri="{BB962C8B-B14F-4D97-AF65-F5344CB8AC3E}">
-        <p14:creationId xmlns:p14="http://schemas.microsoft.com/office/powerpoint/2010/main" val="3283619495"/>
+        <p14:creationId xmlns:p14="http://schemas.microsoft.com/office/powerpoint/2010/main" xmlns="" val="3283619495"/>
       </p:ext>
     </p:extLst>
   </p:cSld>
@@ -15108,31 +15010,88 @@
           <a:p>
             <a:r>
               <a:rPr lang="en-US" dirty="0" smtClean="0"/>
-              <a:t>NLTK </a:t>
+              <a:t>Naïve </a:t>
             </a:r>
             <a:r>
               <a:rPr lang="en-US" dirty="0" err="1" smtClean="0"/>
-              <a:t>analyser</a:t>
+              <a:t>Bayes</a:t>
             </a:r>
             <a:r>
               <a:rPr lang="en-US" dirty="0" smtClean="0"/>
-              <a:t> results – plots</a:t>
+              <a:t> algorithm gave an accuracy of 0.76511</a:t>
             </a:r>
           </a:p>
           <a:p>
             <a:r>
               <a:rPr lang="en-US" dirty="0" smtClean="0"/>
-              <a:t>If we can </a:t>
-            </a:r>
-            <a:r>
-              <a:rPr lang="en-US" dirty="0" err="1" smtClean="0"/>
-              <a:t>compare,then</a:t>
+              <a:t>Training data size : </a:t>
             </a:r>
             <a:r>
               <a:rPr lang="en-US" dirty="0" smtClean="0"/>
-              <a:t> compare</a:t>
-            </a:r>
-            <a:endParaRPr lang="en-US" dirty="0"/>
+              <a:t>1658</a:t>
+            </a:r>
+          </a:p>
+          <a:p>
+            <a:r>
+              <a:rPr lang="en-US" dirty="0" smtClean="0"/>
+              <a:t>Testing </a:t>
+            </a:r>
+            <a:r>
+              <a:rPr lang="en-US" dirty="0" smtClean="0"/>
+              <a:t>data size : </a:t>
+            </a:r>
+            <a:r>
+              <a:rPr lang="en-US" dirty="0" smtClean="0"/>
+              <a:t>711</a:t>
+            </a:r>
+          </a:p>
+          <a:p>
+            <a:r>
+              <a:rPr lang="en-US" dirty="0" smtClean="0"/>
+              <a:t>False </a:t>
+            </a:r>
+            <a:r>
+              <a:rPr lang="en-US" dirty="0" smtClean="0"/>
+              <a:t>Positive : </a:t>
+            </a:r>
+            <a:r>
+              <a:rPr lang="en-US" dirty="0" smtClean="0"/>
+              <a:t>167</a:t>
+            </a:r>
+          </a:p>
+          <a:p>
+            <a:r>
+              <a:rPr lang="en-US" dirty="0" smtClean="0"/>
+              <a:t>True </a:t>
+            </a:r>
+            <a:r>
+              <a:rPr lang="en-US" dirty="0" smtClean="0"/>
+              <a:t>Negative : </a:t>
+            </a:r>
+            <a:r>
+              <a:rPr lang="en-US" dirty="0" smtClean="0"/>
+              <a:t>544</a:t>
+            </a:r>
+          </a:p>
+          <a:p>
+            <a:r>
+              <a:rPr lang="en-US" dirty="0" smtClean="0"/>
+              <a:t>Accuracy </a:t>
+            </a:r>
+            <a:r>
+              <a:rPr lang="en-US" dirty="0" smtClean="0"/>
+              <a:t>: </a:t>
+            </a:r>
+            <a:r>
+              <a:rPr lang="en-US" dirty="0" smtClean="0"/>
+              <a:t>0.76511955</a:t>
+            </a:r>
+          </a:p>
+          <a:p>
+            <a:pPr>
+              <a:buNone/>
+            </a:pPr>
+            <a:endParaRPr lang="en-US" dirty="0" smtClean="0"/>
           </a:p>
         </p:txBody>
       </p:sp>
@@ -15160,10 +15119,34 @@
           </a:p>
         </p:txBody>
       </p:sp>
+      <p:pic>
+        <p:nvPicPr>
+          <p:cNvPr id="5" name="Picture 4" descr="Capture.JPG"/>
+          <p:cNvPicPr>
+            <a:picLocks noChangeAspect="1"/>
+          </p:cNvPicPr>
+          <p:nvPr/>
+        </p:nvPicPr>
+        <p:blipFill>
+          <a:blip r:embed="rId2"/>
+          <a:stretch>
+            <a:fillRect/>
+          </a:stretch>
+        </p:blipFill>
+        <p:spPr>
+          <a:xfrm>
+            <a:off x="5287752" y="2748191"/>
+            <a:ext cx="4591050" cy="2771775"/>
+          </a:xfrm>
+          <a:prstGeom prst="rect">
+            <a:avLst/>
+          </a:prstGeom>
+        </p:spPr>
+      </p:pic>
     </p:spTree>
     <p:extLst>
       <p:ext uri="{BB962C8B-B14F-4D97-AF65-F5344CB8AC3E}">
-        <p14:creationId xmlns:p14="http://schemas.microsoft.com/office/powerpoint/2010/main" val="1786026597"/>
+        <p14:creationId xmlns:p14="http://schemas.microsoft.com/office/powerpoint/2010/main" xmlns="" val="1786026597"/>
       </p:ext>
     </p:extLst>
   </p:cSld>
@@ -15214,6 +15197,109 @@
           <a:p>
             <a:r>
               <a:rPr lang="en-US" dirty="0" smtClean="0"/>
+              <a:t>Results – Naïve </a:t>
+            </a:r>
+            <a:r>
+              <a:rPr lang="en-US" dirty="0" err="1" smtClean="0"/>
+              <a:t>Bayes</a:t>
+            </a:r>
+            <a:r>
+              <a:rPr lang="en-US" dirty="0" smtClean="0"/>
+              <a:t> Classifier</a:t>
+            </a:r>
+            <a:endParaRPr lang="en-US" dirty="0"/>
+          </a:p>
+        </p:txBody>
+      </p:sp>
+      <p:pic>
+        <p:nvPicPr>
+          <p:cNvPr id="5" name="Content Placeholder 4" descr="Capture1.JPG"/>
+          <p:cNvPicPr>
+            <a:picLocks noGrp="1" noChangeAspect="1"/>
+          </p:cNvPicPr>
+          <p:nvPr>
+            <p:ph idx="1"/>
+          </p:nvPr>
+        </p:nvPicPr>
+        <p:blipFill>
+          <a:blip r:embed="rId2"/>
+          <a:stretch>
+            <a:fillRect/>
+          </a:stretch>
+        </p:blipFill>
+        <p:spPr>
+          <a:xfrm>
+            <a:off x="2325401" y="2599377"/>
+            <a:ext cx="5474542" cy="3291583"/>
+          </a:xfrm>
+        </p:spPr>
+      </p:pic>
+      <p:sp>
+        <p:nvSpPr>
+          <p:cNvPr id="4" name="Slide Number Placeholder 3"/>
+          <p:cNvSpPr>
+            <a:spLocks noGrp="1"/>
+          </p:cNvSpPr>
+          <p:nvPr>
+            <p:ph type="sldNum" sz="quarter" idx="12"/>
+          </p:nvPr>
+        </p:nvSpPr>
+        <p:spPr/>
+        <p:txBody>
+          <a:bodyPr/>
+          <a:lstStyle/>
+          <a:p>
+            <a:fld id="{4FAB73BC-B049-4115-A692-8D63A059BFB8}" type="slidenum">
+              <a:rPr lang="en-US" smtClean="0"/>
+              <a:pPr/>
+              <a:t>14</a:t>
+            </a:fld>
+            <a:endParaRPr lang="en-US" dirty="0"/>
+          </a:p>
+        </p:txBody>
+      </p:sp>
+    </p:spTree>
+  </p:cSld>
+  <p:clrMapOvr>
+    <a:masterClrMapping/>
+  </p:clrMapOvr>
+</p:sld>
+</file>
+
+<file path=ppt/slides/slide15.xml><?xml version="1.0" encoding="utf-8"?>
+<p:sld xmlns:a="http://schemas.openxmlformats.org/drawingml/2006/main" xmlns:r="http://schemas.openxmlformats.org/officeDocument/2006/relationships" xmlns:p="http://schemas.openxmlformats.org/presentationml/2006/main">
+  <p:cSld>
+    <p:spTree>
+      <p:nvGrpSpPr>
+        <p:cNvPr id="1" name=""/>
+        <p:cNvGrpSpPr/>
+        <p:nvPr/>
+      </p:nvGrpSpPr>
+      <p:grpSpPr>
+        <a:xfrm>
+          <a:off x="0" y="0"/>
+          <a:ext cx="0" cy="0"/>
+          <a:chOff x="0" y="0"/>
+          <a:chExt cx="0" cy="0"/>
+        </a:xfrm>
+      </p:grpSpPr>
+      <p:sp>
+        <p:nvSpPr>
+          <p:cNvPr id="2" name="Title 1"/>
+          <p:cNvSpPr>
+            <a:spLocks noGrp="1"/>
+          </p:cNvSpPr>
+          <p:nvPr>
+            <p:ph type="title"/>
+          </p:nvPr>
+        </p:nvSpPr>
+        <p:spPr/>
+        <p:txBody>
+          <a:bodyPr/>
+          <a:lstStyle/>
+          <a:p>
+            <a:r>
+              <a:rPr lang="en-US" dirty="0" smtClean="0"/>
               <a:t>Results – Sentiment analysis using VADER</a:t>
             </a:r>
             <a:endParaRPr lang="en-US" dirty="0"/>
@@ -15234,7 +15320,7 @@
           <a:blip r:embed="rId2">
             <a:extLst>
               <a:ext uri="{28A0092B-C50C-407E-A947-70E740481C1C}">
-                <a14:useLocalDpi xmlns:a14="http://schemas.microsoft.com/office/drawing/2010/main" val="0"/>
+                <a14:useLocalDpi xmlns:a14="http://schemas.microsoft.com/office/drawing/2010/main" xmlns="" val="0"/>
               </a:ext>
             </a:extLst>
           </a:blip>
@@ -15267,7 +15353,7 @@
             <a:fld id="{4FAB73BC-B049-4115-A692-8D63A059BFB8}" type="slidenum">
               <a:rPr lang="en-US" smtClean="0"/>
               <a:pPr/>
-              <a:t>14</a:t>
+              <a:t>15</a:t>
             </a:fld>
             <a:endParaRPr lang="en-US" dirty="0"/>
           </a:p>
@@ -15483,7 +15569,7 @@
     </p:spTree>
     <p:extLst>
       <p:ext uri="{BB962C8B-B14F-4D97-AF65-F5344CB8AC3E}">
-        <p14:creationId xmlns:p14="http://schemas.microsoft.com/office/powerpoint/2010/main" val="2258922808"/>
+        <p14:creationId xmlns:p14="http://schemas.microsoft.com/office/powerpoint/2010/main" xmlns="" val="2258922808"/>
       </p:ext>
     </p:extLst>
   </p:cSld>
@@ -15500,7 +15586,7 @@
 </p:sld>
 </file>
 
-<file path=ppt/slides/slide15.xml><?xml version="1.0" encoding="utf-8"?>
+<file path=ppt/slides/slide16.xml><?xml version="1.0" encoding="utf-8"?>
 <p:sld xmlns:a="http://schemas.openxmlformats.org/drawingml/2006/main" xmlns:r="http://schemas.openxmlformats.org/officeDocument/2006/relationships" xmlns:p="http://schemas.openxmlformats.org/presentationml/2006/main">
   <p:cSld>
     <p:spTree>
@@ -15553,7 +15639,7 @@
           <a:blip r:embed="rId2">
             <a:extLst>
               <a:ext uri="{28A0092B-C50C-407E-A947-70E740481C1C}">
-                <a14:useLocalDpi xmlns:a14="http://schemas.microsoft.com/office/drawing/2010/main" val="0"/>
+                <a14:useLocalDpi xmlns:a14="http://schemas.microsoft.com/office/drawing/2010/main" xmlns="" val="0"/>
               </a:ext>
             </a:extLst>
           </a:blip>
@@ -15586,7 +15672,7 @@
             <a:fld id="{4FAB73BC-B049-4115-A692-8D63A059BFB8}" type="slidenum">
               <a:rPr lang="en-US" smtClean="0"/>
               <a:pPr/>
-              <a:t>15</a:t>
+              <a:t>16</a:t>
             </a:fld>
             <a:endParaRPr lang="en-US" dirty="0"/>
           </a:p>
@@ -15604,7 +15690,7 @@
           <a:blip r:embed="rId3">
             <a:extLst>
               <a:ext uri="{28A0092B-C50C-407E-A947-70E740481C1C}">
-                <a14:useLocalDpi xmlns:a14="http://schemas.microsoft.com/office/drawing/2010/main" val="0"/>
+                <a14:useLocalDpi xmlns:a14="http://schemas.microsoft.com/office/drawing/2010/main" xmlns="" val="0"/>
               </a:ext>
             </a:extLst>
           </a:blip>
@@ -16055,7 +16141,7 @@
     </p:spTree>
     <p:extLst>
       <p:ext uri="{BB962C8B-B14F-4D97-AF65-F5344CB8AC3E}">
-        <p14:creationId xmlns:p14="http://schemas.microsoft.com/office/powerpoint/2010/main" val="2413282483"/>
+        <p14:creationId xmlns:p14="http://schemas.microsoft.com/office/powerpoint/2010/main" xmlns="" val="2413282483"/>
       </p:ext>
     </p:extLst>
   </p:cSld>
@@ -16072,7 +16158,7 @@
 </p:sld>
 </file>
 
-<file path=ppt/slides/slide16.xml><?xml version="1.0" encoding="utf-8"?>
+<file path=ppt/slides/slide17.xml><?xml version="1.0" encoding="utf-8"?>
 <p:sld xmlns:a="http://schemas.openxmlformats.org/drawingml/2006/main" xmlns:r="http://schemas.openxmlformats.org/officeDocument/2006/relationships" xmlns:p="http://schemas.openxmlformats.org/presentationml/2006/main">
   <p:cSld>
     <p:spTree>
@@ -16125,7 +16211,7 @@
           <a:blip r:embed="rId2">
             <a:extLst>
               <a:ext uri="{28A0092B-C50C-407E-A947-70E740481C1C}">
-                <a14:useLocalDpi xmlns:a14="http://schemas.microsoft.com/office/drawing/2010/main" val="0"/>
+                <a14:useLocalDpi xmlns:a14="http://schemas.microsoft.com/office/drawing/2010/main" xmlns="" val="0"/>
               </a:ext>
             </a:extLst>
           </a:blip>
@@ -16158,7 +16244,7 @@
             <a:fld id="{4FAB73BC-B049-4115-A692-8D63A059BFB8}" type="slidenum">
               <a:rPr lang="en-US" smtClean="0"/>
               <a:pPr/>
-              <a:t>16</a:t>
+              <a:t>17</a:t>
             </a:fld>
             <a:endParaRPr lang="en-US" dirty="0"/>
           </a:p>
@@ -16176,7 +16262,7 @@
           <a:blip r:embed="rId3">
             <a:extLst>
               <a:ext uri="{28A0092B-C50C-407E-A947-70E740481C1C}">
-                <a14:useLocalDpi xmlns:a14="http://schemas.microsoft.com/office/drawing/2010/main" val="0"/>
+                <a14:useLocalDpi xmlns:a14="http://schemas.microsoft.com/office/drawing/2010/main" xmlns="" val="0"/>
               </a:ext>
             </a:extLst>
           </a:blip>
@@ -16627,122 +16713,7 @@
     </p:spTree>
     <p:extLst>
       <p:ext uri="{BB962C8B-B14F-4D97-AF65-F5344CB8AC3E}">
-        <p14:creationId xmlns:p14="http://schemas.microsoft.com/office/powerpoint/2010/main" val="4043714280"/>
-      </p:ext>
-    </p:extLst>
-  </p:cSld>
-  <p:clrMapOvr>
-    <a:masterClrMapping/>
-  </p:clrMapOvr>
-  <p:timing>
-    <p:tnLst>
-      <p:par>
-        <p:cTn id="1" dur="indefinite" restart="never" nodeType="tmRoot"/>
-      </p:par>
-    </p:tnLst>
-  </p:timing>
-</p:sld>
-</file>
-
-<file path=ppt/slides/slide17.xml><?xml version="1.0" encoding="utf-8"?>
-<p:sld xmlns:a="http://schemas.openxmlformats.org/drawingml/2006/main" xmlns:r="http://schemas.openxmlformats.org/officeDocument/2006/relationships" xmlns:p="http://schemas.openxmlformats.org/presentationml/2006/main">
-  <p:cSld>
-    <p:spTree>
-      <p:nvGrpSpPr>
-        <p:cNvPr id="1" name=""/>
-        <p:cNvGrpSpPr/>
-        <p:nvPr/>
-      </p:nvGrpSpPr>
-      <p:grpSpPr>
-        <a:xfrm>
-          <a:off x="0" y="0"/>
-          <a:ext cx="0" cy="0"/>
-          <a:chOff x="0" y="0"/>
-          <a:chExt cx="0" cy="0"/>
-        </a:xfrm>
-      </p:grpSpPr>
-      <p:sp>
-        <p:nvSpPr>
-          <p:cNvPr id="2" name="Title 1"/>
-          <p:cNvSpPr>
-            <a:spLocks noGrp="1"/>
-          </p:cNvSpPr>
-          <p:nvPr>
-            <p:ph type="title"/>
-          </p:nvPr>
-        </p:nvSpPr>
-        <p:spPr/>
-        <p:txBody>
-          <a:bodyPr/>
-          <a:lstStyle/>
-          <a:p>
-            <a:r>
-              <a:rPr lang="en-US" dirty="0" smtClean="0"/>
-              <a:t>Future Work</a:t>
-            </a:r>
-            <a:endParaRPr lang="en-US" dirty="0"/>
-          </a:p>
-        </p:txBody>
-      </p:sp>
-      <p:sp>
-        <p:nvSpPr>
-          <p:cNvPr id="3" name="Content Placeholder 2"/>
-          <p:cNvSpPr>
-            <a:spLocks noGrp="1"/>
-          </p:cNvSpPr>
-          <p:nvPr>
-            <p:ph idx="1"/>
-          </p:nvPr>
-        </p:nvSpPr>
-        <p:spPr/>
-        <p:txBody>
-          <a:bodyPr/>
-          <a:lstStyle/>
-          <a:p>
-            <a:r>
-              <a:rPr lang="en-US" dirty="0" smtClean="0"/>
-              <a:t>Using other models such as Support Vector and Maximum Entropy Classifiers.</a:t>
-            </a:r>
-          </a:p>
-          <a:p>
-            <a:endParaRPr lang="en-US" dirty="0"/>
-          </a:p>
-          <a:p>
-            <a:r>
-              <a:rPr lang="en-US" dirty="0" smtClean="0"/>
-              <a:t>Using word n-grams (sequence of n- consecutive words) for the feature space.</a:t>
-            </a:r>
-          </a:p>
-        </p:txBody>
-      </p:sp>
-      <p:sp>
-        <p:nvSpPr>
-          <p:cNvPr id="4" name="Slide Number Placeholder 3"/>
-          <p:cNvSpPr>
-            <a:spLocks noGrp="1"/>
-          </p:cNvSpPr>
-          <p:nvPr>
-            <p:ph type="sldNum" sz="quarter" idx="12"/>
-          </p:nvPr>
-        </p:nvSpPr>
-        <p:spPr/>
-        <p:txBody>
-          <a:bodyPr/>
-          <a:lstStyle/>
-          <a:p>
-            <a:fld id="{4FAB73BC-B049-4115-A692-8D63A059BFB8}" type="slidenum">
-              <a:rPr lang="en-US" smtClean="0"/>
-              <a:pPr/>
-              <a:t>17</a:t>
-            </a:fld>
-            <a:endParaRPr lang="en-US" dirty="0"/>
-          </a:p>
-        </p:txBody>
-      </p:sp>
-    </p:spTree>
-    <p:extLst>
-      <p:ext uri="{BB962C8B-B14F-4D97-AF65-F5344CB8AC3E}">
-        <p14:creationId xmlns:p14="http://schemas.microsoft.com/office/powerpoint/2010/main" val="3030440218"/>
+        <p14:creationId xmlns:p14="http://schemas.microsoft.com/office/powerpoint/2010/main" xmlns="" val="4043714280"/>
       </p:ext>
     </p:extLst>
   </p:cSld>
@@ -16793,7 +16764,7 @@
           <a:p>
             <a:r>
               <a:rPr lang="en-US" dirty="0" smtClean="0"/>
-              <a:t>References</a:t>
+              <a:t>Future Work</a:t>
             </a:r>
             <a:endParaRPr lang="en-US" dirty="0"/>
           </a:p>
@@ -16814,68 +16785,18 @@
           <a:bodyPr/>
           <a:lstStyle/>
           <a:p>
-            <a:pPr marL="457200" indent="-457200">
-              <a:buAutoNum type="arabicPeriod"/>
-            </a:pPr>
-            <a:r>
-              <a:rPr lang="en-US" dirty="0" smtClean="0">
-                <a:hlinkClick r:id="rId2"/>
-              </a:rPr>
-              <a:t>https</a:t>
-            </a:r>
-            <a:r>
-              <a:rPr lang="en-US" dirty="0">
-                <a:hlinkClick r:id="rId2"/>
-              </a:rPr>
-              <a:t>://</a:t>
-            </a:r>
-            <a:r>
-              <a:rPr lang="en-US" dirty="0" smtClean="0">
-                <a:hlinkClick r:id="rId2"/>
-              </a:rPr>
-              <a:t>en.wikipedia.org/wiki/Yelp</a:t>
-            </a:r>
-            <a:endParaRPr lang="en-US" dirty="0" smtClean="0"/>
-          </a:p>
-          <a:p>
-            <a:pPr marL="457200" indent="-457200">
-              <a:buAutoNum type="arabicPeriod"/>
-            </a:pPr>
-            <a:r>
-              <a:rPr lang="en-US" dirty="0">
-                <a:hlinkClick r:id="rId3"/>
-              </a:rPr>
-              <a:t>https://</a:t>
-            </a:r>
-            <a:r>
-              <a:rPr lang="en-US" dirty="0" smtClean="0">
-                <a:hlinkClick r:id="rId3"/>
-              </a:rPr>
-              <a:t>github.com/cjhutto/vaderSentiment</a:t>
-            </a:r>
-            <a:endParaRPr lang="en-US" dirty="0" smtClean="0"/>
-          </a:p>
-          <a:p>
-            <a:pPr marL="457200" indent="-457200">
-              <a:buAutoNum type="arabicPeriod"/>
-            </a:pPr>
-            <a:r>
-              <a:rPr lang="en-US" dirty="0" err="1"/>
-              <a:t>Hutto</a:t>
-            </a:r>
-            <a:r>
-              <a:rPr lang="en-US" dirty="0"/>
-              <a:t>, C.J. &amp; Gilbert, E.E. (2014). VADER: A Parsimonious Rule-based Model for Sentiment Analysis of Social Media Text. Eighth International Conference on Weblogs and Social Media (ICWSM-14). Ann Arbor, MI, June 2014. </a:t>
-            </a:r>
-            <a:endParaRPr lang="en-US" dirty="0" smtClean="0"/>
-          </a:p>
-          <a:p>
-            <a:pPr marL="457200" indent="-457200">
-              <a:buAutoNum type="arabicPeriod"/>
-            </a:pPr>
-            <a:r>
-              <a:rPr lang="en-US" dirty="0"/>
-              <a:t>http://www.statsoft.com/textbook/naive-bayes-classifier</a:t>
+            <a:r>
+              <a:rPr lang="en-US" dirty="0" smtClean="0"/>
+              <a:t>Using other models such as Support Vector and Maximum Entropy Classifiers.</a:t>
+            </a:r>
+          </a:p>
+          <a:p>
+            <a:endParaRPr lang="en-US" dirty="0"/>
+          </a:p>
+          <a:p>
+            <a:r>
+              <a:rPr lang="en-US" dirty="0" smtClean="0"/>
+              <a:t>Using word n-grams (sequence of n- consecutive words) for the feature space.</a:t>
             </a:r>
           </a:p>
         </p:txBody>
@@ -16907,7 +16828,172 @@
     </p:spTree>
     <p:extLst>
       <p:ext uri="{BB962C8B-B14F-4D97-AF65-F5344CB8AC3E}">
-        <p14:creationId xmlns:p14="http://schemas.microsoft.com/office/powerpoint/2010/main" val="3013565489"/>
+        <p14:creationId xmlns:p14="http://schemas.microsoft.com/office/powerpoint/2010/main" xmlns="" val="3030440218"/>
+      </p:ext>
+    </p:extLst>
+  </p:cSld>
+  <p:clrMapOvr>
+    <a:masterClrMapping/>
+  </p:clrMapOvr>
+  <p:timing>
+    <p:tnLst>
+      <p:par>
+        <p:cTn id="1" dur="indefinite" restart="never" nodeType="tmRoot"/>
+      </p:par>
+    </p:tnLst>
+  </p:timing>
+</p:sld>
+</file>
+
+<file path=ppt/slides/slide19.xml><?xml version="1.0" encoding="utf-8"?>
+<p:sld xmlns:a="http://schemas.openxmlformats.org/drawingml/2006/main" xmlns:r="http://schemas.openxmlformats.org/officeDocument/2006/relationships" xmlns:p="http://schemas.openxmlformats.org/presentationml/2006/main">
+  <p:cSld>
+    <p:spTree>
+      <p:nvGrpSpPr>
+        <p:cNvPr id="1" name=""/>
+        <p:cNvGrpSpPr/>
+        <p:nvPr/>
+      </p:nvGrpSpPr>
+      <p:grpSpPr>
+        <a:xfrm>
+          <a:off x="0" y="0"/>
+          <a:ext cx="0" cy="0"/>
+          <a:chOff x="0" y="0"/>
+          <a:chExt cx="0" cy="0"/>
+        </a:xfrm>
+      </p:grpSpPr>
+      <p:sp>
+        <p:nvSpPr>
+          <p:cNvPr id="2" name="Title 1"/>
+          <p:cNvSpPr>
+            <a:spLocks noGrp="1"/>
+          </p:cNvSpPr>
+          <p:nvPr>
+            <p:ph type="title"/>
+          </p:nvPr>
+        </p:nvSpPr>
+        <p:spPr/>
+        <p:txBody>
+          <a:bodyPr/>
+          <a:lstStyle/>
+          <a:p>
+            <a:r>
+              <a:rPr lang="en-US" dirty="0" smtClean="0"/>
+              <a:t>References</a:t>
+            </a:r>
+            <a:endParaRPr lang="en-US" dirty="0"/>
+          </a:p>
+        </p:txBody>
+      </p:sp>
+      <p:sp>
+        <p:nvSpPr>
+          <p:cNvPr id="3" name="Content Placeholder 2"/>
+          <p:cNvSpPr>
+            <a:spLocks noGrp="1"/>
+          </p:cNvSpPr>
+          <p:nvPr>
+            <p:ph idx="1"/>
+          </p:nvPr>
+        </p:nvSpPr>
+        <p:spPr/>
+        <p:txBody>
+          <a:bodyPr/>
+          <a:lstStyle/>
+          <a:p>
+            <a:pPr marL="457200" indent="-457200">
+              <a:buAutoNum type="arabicPeriod"/>
+            </a:pPr>
+            <a:r>
+              <a:rPr lang="en-US" dirty="0" smtClean="0">
+                <a:hlinkClick r:id="rId2"/>
+              </a:rPr>
+              <a:t>https</a:t>
+            </a:r>
+            <a:r>
+              <a:rPr lang="en-US" dirty="0">
+                <a:hlinkClick r:id="rId2"/>
+              </a:rPr>
+              <a:t>://</a:t>
+            </a:r>
+            <a:r>
+              <a:rPr lang="en-US" dirty="0" smtClean="0">
+                <a:hlinkClick r:id="rId2"/>
+              </a:rPr>
+              <a:t>en.wikipedia.org/wiki/Yelp</a:t>
+            </a:r>
+            <a:endParaRPr lang="en-US" dirty="0" smtClean="0"/>
+          </a:p>
+          <a:p>
+            <a:pPr marL="457200" indent="-457200">
+              <a:buAutoNum type="arabicPeriod"/>
+            </a:pPr>
+            <a:r>
+              <a:rPr lang="en-US" dirty="0">
+                <a:hlinkClick r:id="rId3"/>
+              </a:rPr>
+              <a:t>https://</a:t>
+            </a:r>
+            <a:r>
+              <a:rPr lang="en-US" dirty="0" smtClean="0">
+                <a:hlinkClick r:id="rId3"/>
+              </a:rPr>
+              <a:t>github.com/cjhutto/vaderSentiment</a:t>
+            </a:r>
+            <a:endParaRPr lang="en-US" dirty="0" smtClean="0"/>
+          </a:p>
+          <a:p>
+            <a:pPr marL="457200" indent="-457200">
+              <a:buAutoNum type="arabicPeriod"/>
+            </a:pPr>
+            <a:r>
+              <a:rPr lang="en-US" dirty="0" err="1"/>
+              <a:t>Hutto</a:t>
+            </a:r>
+            <a:r>
+              <a:rPr lang="en-US" dirty="0"/>
+              <a:t>, C.J. &amp; Gilbert, E.E. (2014). VADER: A Parsimonious Rule-based Model for Sentiment Analysis of Social Media Text. Eighth International Conference on Weblogs and Social Media (ICWSM-14). Ann Arbor, MI, June 2014. </a:t>
+            </a:r>
+            <a:endParaRPr lang="en-US" dirty="0" smtClean="0"/>
+          </a:p>
+          <a:p>
+            <a:pPr marL="457200" indent="-457200">
+              <a:buAutoNum type="arabicPeriod"/>
+            </a:pPr>
+            <a:r>
+              <a:rPr lang="en-US" dirty="0"/>
+              <a:t>http://www.statsoft.com/textbook/naive-bayes-classifier</a:t>
+            </a:r>
+          </a:p>
+        </p:txBody>
+      </p:sp>
+      <p:sp>
+        <p:nvSpPr>
+          <p:cNvPr id="4" name="Slide Number Placeholder 3"/>
+          <p:cNvSpPr>
+            <a:spLocks noGrp="1"/>
+          </p:cNvSpPr>
+          <p:nvPr>
+            <p:ph type="sldNum" sz="quarter" idx="12"/>
+          </p:nvPr>
+        </p:nvSpPr>
+        <p:spPr/>
+        <p:txBody>
+          <a:bodyPr/>
+          <a:lstStyle/>
+          <a:p>
+            <a:fld id="{4FAB73BC-B049-4115-A692-8D63A059BFB8}" type="slidenum">
+              <a:rPr lang="en-US" smtClean="0"/>
+              <a:pPr/>
+              <a:t>19</a:t>
+            </a:fld>
+            <a:endParaRPr lang="en-US" dirty="0"/>
+          </a:p>
+        </p:txBody>
+      </p:sp>
+    </p:spTree>
+    <p:extLst>
+      <p:ext uri="{BB962C8B-B14F-4D97-AF65-F5344CB8AC3E}">
+        <p14:creationId xmlns:p14="http://schemas.microsoft.com/office/powerpoint/2010/main" xmlns="" val="3013565489"/>
       </p:ext>
     </p:extLst>
   </p:cSld>
@@ -17042,7 +17128,7 @@
     </p:spTree>
     <p:extLst>
       <p:ext uri="{BB962C8B-B14F-4D97-AF65-F5344CB8AC3E}">
-        <p14:creationId xmlns:p14="http://schemas.microsoft.com/office/powerpoint/2010/main" val="2442651194"/>
+        <p14:creationId xmlns:p14="http://schemas.microsoft.com/office/powerpoint/2010/main" xmlns="" val="2442651194"/>
       </p:ext>
     </p:extLst>
   </p:cSld>
@@ -17230,7 +17316,7 @@
     </p:spTree>
     <p:extLst>
       <p:ext uri="{BB962C8B-B14F-4D97-AF65-F5344CB8AC3E}">
-        <p14:creationId xmlns:p14="http://schemas.microsoft.com/office/powerpoint/2010/main" val="1667925211"/>
+        <p14:creationId xmlns:p14="http://schemas.microsoft.com/office/powerpoint/2010/main" xmlns="" val="1667925211"/>
       </p:ext>
     </p:extLst>
   </p:cSld>
@@ -17390,7 +17476,7 @@
           <a:blip r:embed="rId2">
             <a:extLst>
               <a:ext uri="{28A0092B-C50C-407E-A947-70E740481C1C}">
-                <a14:useLocalDpi xmlns:a14="http://schemas.microsoft.com/office/drawing/2010/main" val="0"/>
+                <a14:useLocalDpi xmlns:a14="http://schemas.microsoft.com/office/drawing/2010/main" xmlns="" val="0"/>
               </a:ext>
             </a:extLst>
           </a:blip>
@@ -17435,7 +17521,7 @@
     </p:spTree>
     <p:extLst>
       <p:ext uri="{BB962C8B-B14F-4D97-AF65-F5344CB8AC3E}">
-        <p14:creationId xmlns:p14="http://schemas.microsoft.com/office/powerpoint/2010/main" val="3339542320"/>
+        <p14:creationId xmlns:p14="http://schemas.microsoft.com/office/powerpoint/2010/main" xmlns="" val="3339542320"/>
       </p:ext>
     </p:extLst>
   </p:cSld>
@@ -17571,7 +17657,7 @@
     </p:spTree>
     <p:extLst>
       <p:ext uri="{BB962C8B-B14F-4D97-AF65-F5344CB8AC3E}">
-        <p14:creationId xmlns:p14="http://schemas.microsoft.com/office/powerpoint/2010/main" val="3702515033"/>
+        <p14:creationId xmlns:p14="http://schemas.microsoft.com/office/powerpoint/2010/main" xmlns="" val="3702515033"/>
       </p:ext>
     </p:extLst>
   </p:cSld>
@@ -17632,7 +17718,6 @@
               <a:rPr lang="en-US" dirty="0"/>
               <a:t>Flow</a:t>
             </a:r>
-            <a:endParaRPr lang="en-US" dirty="0"/>
           </a:p>
         </p:txBody>
       </p:sp>
@@ -17670,7 +17755,7 @@
             <p:ph idx="1"/>
             <p:extLst>
               <p:ext uri="{D42A27DB-BD31-4B8C-83A1-F6EECF244321}">
-                <p14:modId xmlns:p14="http://schemas.microsoft.com/office/powerpoint/2010/main" val="3737081894"/>
+                <p14:modId xmlns:p14="http://schemas.microsoft.com/office/powerpoint/2010/main" xmlns="" val="3737081894"/>
               </p:ext>
             </p:extLst>
           </p:nvPr>
@@ -17688,7 +17773,7 @@
     </p:spTree>
     <p:extLst>
       <p:ext uri="{BB962C8B-B14F-4D97-AF65-F5344CB8AC3E}">
-        <p14:creationId xmlns:p14="http://schemas.microsoft.com/office/powerpoint/2010/main" val="2634859669"/>
+        <p14:creationId xmlns:p14="http://schemas.microsoft.com/office/powerpoint/2010/main" xmlns="" val="2634859669"/>
       </p:ext>
     </p:extLst>
   </p:cSld>
@@ -17851,7 +17936,7 @@
     </p:spTree>
     <p:extLst>
       <p:ext uri="{BB962C8B-B14F-4D97-AF65-F5344CB8AC3E}">
-        <p14:creationId xmlns:p14="http://schemas.microsoft.com/office/powerpoint/2010/main" val="1660388467"/>
+        <p14:creationId xmlns:p14="http://schemas.microsoft.com/office/powerpoint/2010/main" xmlns="" val="1660388467"/>
       </p:ext>
     </p:extLst>
   </p:cSld>
@@ -17932,11 +18017,7 @@
           <a:p>
             <a:r>
               <a:rPr lang="en-US" dirty="0" smtClean="0"/>
-              <a:t>What is </a:t>
-            </a:r>
-            <a:r>
-              <a:rPr lang="en-US" dirty="0" smtClean="0"/>
-              <a:t>NLTK</a:t>
+              <a:t>What is NLTK</a:t>
             </a:r>
           </a:p>
           <a:p>
@@ -18133,7 +18214,7 @@
           <a:blip r:embed="rId3">
             <a:extLst>
               <a:ext uri="{28A0092B-C50C-407E-A947-70E740481C1C}">
-                <a14:useLocalDpi xmlns:a14="http://schemas.microsoft.com/office/drawing/2010/main" val="0"/>
+                <a14:useLocalDpi xmlns:a14="http://schemas.microsoft.com/office/drawing/2010/main" xmlns="" val="0"/>
               </a:ext>
             </a:extLst>
           </a:blip>
@@ -18153,7 +18234,7 @@
           <a:noFill/>
           <a:extLst>
             <a:ext uri="{909E8E84-426E-40DD-AFC4-6F175D3DCCD1}">
-              <a14:hiddenFill xmlns:a14="http://schemas.microsoft.com/office/drawing/2010/main">
+              <a14:hiddenFill xmlns:a14="http://schemas.microsoft.com/office/drawing/2010/main" xmlns="">
                 <a:solidFill>
                   <a:srgbClr val="FFFFFF"/>
                 </a:solidFill>
@@ -18165,7 +18246,7 @@
     </p:spTree>
     <p:extLst>
       <p:ext uri="{BB962C8B-B14F-4D97-AF65-F5344CB8AC3E}">
-        <p14:creationId xmlns:p14="http://schemas.microsoft.com/office/powerpoint/2010/main" val="158264648"/>
+        <p14:creationId xmlns:p14="http://schemas.microsoft.com/office/powerpoint/2010/main" xmlns="" val="158264648"/>
       </p:ext>
     </p:extLst>
   </p:cSld>
@@ -18320,7 +18401,7 @@
           <a:blip r:embed="rId3">
             <a:extLst>
               <a:ext uri="{28A0092B-C50C-407E-A947-70E740481C1C}">
-                <a14:useLocalDpi xmlns:a14="http://schemas.microsoft.com/office/drawing/2010/main" val="0"/>
+                <a14:useLocalDpi xmlns:a14="http://schemas.microsoft.com/office/drawing/2010/main" xmlns="" val="0"/>
               </a:ext>
             </a:extLst>
           </a:blip>
@@ -18340,7 +18421,7 @@
           <a:noFill/>
           <a:extLst>
             <a:ext uri="{909E8E84-426E-40DD-AFC4-6F175D3DCCD1}">
-              <a14:hiddenFill xmlns:a14="http://schemas.microsoft.com/office/drawing/2010/main">
+              <a14:hiddenFill xmlns:a14="http://schemas.microsoft.com/office/drawing/2010/main" xmlns="">
                 <a:solidFill>
                   <a:srgbClr val="FFFFFF"/>
                 </a:solidFill>
@@ -18370,7 +18451,7 @@
     </p:spTree>
     <p:extLst>
       <p:ext uri="{BB962C8B-B14F-4D97-AF65-F5344CB8AC3E}">
-        <p14:creationId xmlns:p14="http://schemas.microsoft.com/office/powerpoint/2010/main" val="2278894467"/>
+        <p14:creationId xmlns:p14="http://schemas.microsoft.com/office/powerpoint/2010/main" xmlns="" val="2278894467"/>
       </p:ext>
     </p:extLst>
   </p:cSld>
@@ -18430,7 +18511,7 @@
     </a:clrScheme>
     <a:fontScheme name="Berlin">
       <a:majorFont>
-        <a:latin typeface="Trebuchet MS" panose="020B0603020202020204"/>
+        <a:latin typeface="Trebuchet MS"/>
         <a:ea typeface=""/>
         <a:cs typeface=""/>
         <a:font script="Jpan" typeface="ＭＳ Ｐゴシック"/>
@@ -18465,7 +18546,7 @@
         <a:font script="Geor" typeface="Sylfaen"/>
       </a:majorFont>
       <a:minorFont>
-        <a:latin typeface="Trebuchet MS" panose="020B0603020202020204"/>
+        <a:latin typeface="Trebuchet MS"/>
         <a:ea typeface=""/>
         <a:cs typeface=""/>
         <a:font script="Jpan" typeface="ＭＳ Ｐゴシック"/>
@@ -18635,7 +18716,7 @@
   <a:extraClrSchemeLst/>
   <a:extLst>
     <a:ext uri="{05A4C25C-085E-4340-85A3-A5531E510DB2}">
-      <thm15:themeFamily xmlns:thm15="http://schemas.microsoft.com/office/thememl/2012/main" name="Berlin" id="{7B5DBA9E-B069-418E-9360-A61BDD0615A4}" vid="{C0CBE056-4EF4-4D92-969E-947779DA7AAA}"/>
+      <thm15:themeFamily xmlns:thm15="http://schemas.microsoft.com/office/thememl/2012/main" xmlns="" name="Berlin" id="{7B5DBA9E-B069-418E-9360-A61BDD0615A4}" vid="{C0CBE056-4EF4-4D92-969E-947779DA7AAA}"/>
     </a:ext>
   </a:extLst>
 </a:theme>
@@ -18684,7 +18765,7 @@
     </a:clrScheme>
     <a:fontScheme name="Office">
       <a:majorFont>
-        <a:latin typeface="Calibri Light" panose="020F0302020204030204"/>
+        <a:latin typeface="Calibri Light"/>
         <a:ea typeface=""/>
         <a:cs typeface=""/>
         <a:font script="Jpan" typeface="ＭＳ Ｐゴシック"/>
@@ -18719,7 +18800,7 @@
         <a:font script="Geor" typeface="Sylfaen"/>
       </a:majorFont>
       <a:minorFont>
-        <a:latin typeface="Calibri" panose="020F0502020204030204"/>
+        <a:latin typeface="Calibri"/>
         <a:ea typeface=""/>
         <a:cs typeface=""/>
         <a:font script="Jpan" typeface="ＭＳ Ｐゴシック"/>
@@ -18896,7 +18977,7 @@
   <a:extraClrSchemeLst/>
   <a:extLst>
     <a:ext uri="{05A4C25C-085E-4340-85A3-A5531E510DB2}">
-      <thm15:themeFamily xmlns:thm15="http://schemas.microsoft.com/office/thememl/2012/main" name="Office Theme" id="{62F939B6-93AF-4DB8-9C6B-D6C7DFDC589F}" vid="{4A3C46E8-61CC-4603-A589-7422A47A8E4A}"/>
+      <thm15:themeFamily xmlns:thm15="http://schemas.microsoft.com/office/thememl/2012/main" xmlns="" name="Office Theme" id="{62F939B6-93AF-4DB8-9C6B-D6C7DFDC589F}" vid="{4A3C46E8-61CC-4603-A589-7422A47A8E4A}"/>
     </a:ext>
   </a:extLst>
 </a:theme>

</xml_diff>